<commit_message>
Updates nach neuer Raspi Installation
</commit_message>
<xml_diff>
--- a/oriDocs/Architektur.pptx
+++ b/oriDocs/Architektur.pptx
@@ -367,7 +367,7 @@
           <a:p>
             <a:fld id="{E679DB1F-D61D-433C-BF0D-19DF96EA831A}" type="datetimeFigureOut">
               <a:rPr lang="de-DE" smtClean="0"/>
-              <a:t>27.10.2019</a:t>
+              <a:t>12.01.2021</a:t>
             </a:fld>
             <a:endParaRPr lang="de-DE"/>
           </a:p>
@@ -684,131 +684,7 @@
           <a:bodyPr/>
           <a:lstStyle/>
           <a:p>
-            <a:r>
-              <a:rPr lang="de-DE" dirty="0"/>
-              <a:t>Pi01 – 11,90</a:t>
-            </a:r>
-          </a:p>
-          <a:p>
             <a:endParaRPr lang="de-DE" dirty="0"/>
-          </a:p>
-          <a:p>
-            <a:r>
-              <a:rPr lang="de-DE" dirty="0"/>
-              <a:t>Pi02 – 32,50</a:t>
-            </a:r>
-          </a:p>
-          <a:p>
-            <a:r>
-              <a:rPr lang="de-DE" dirty="0"/>
-              <a:t>32 IO</a:t>
-            </a:r>
-          </a:p>
-          <a:p>
-            <a:pPr marL="0" marR="0" lvl="0" indent="0" algn="l" defTabSz="914400" rtl="0" eaLnBrk="1" fontAlgn="auto" latinLnBrk="0" hangingPunct="1">
-              <a:lnSpc>
-                <a:spcPct val="100000"/>
-              </a:lnSpc>
-              <a:spcBef>
-                <a:spcPts val="0"/>
-              </a:spcBef>
-              <a:spcAft>
-                <a:spcPts val="0"/>
-              </a:spcAft>
-              <a:buClrTx/>
-              <a:buSzTx/>
-              <a:buFontTx/>
-              <a:buNone/>
-              <a:tabLst/>
-              <a:defRPr/>
-            </a:pPr>
-            <a:r>
-              <a:rPr lang="de-DE" dirty="0"/>
-              <a:t>Bis 4 pro </a:t>
-            </a:r>
-            <a:r>
-              <a:rPr lang="de-DE" dirty="0" err="1"/>
-              <a:t>Raspi</a:t>
-            </a:r>
-            <a:endParaRPr lang="de-DE" dirty="0"/>
-          </a:p>
-          <a:p>
-            <a:endParaRPr lang="de-DE" dirty="0"/>
-          </a:p>
-          <a:p>
-            <a:r>
-              <a:rPr lang="de-DE" dirty="0"/>
-              <a:t>Pi03 – 23,75</a:t>
-            </a:r>
-          </a:p>
-          <a:p>
-            <a:r>
-              <a:rPr lang="de-DE" dirty="0"/>
-              <a:t>8x </a:t>
-            </a:r>
-            <a:r>
-              <a:rPr lang="de-DE" dirty="0" err="1"/>
-              <a:t>Servo</a:t>
-            </a:r>
-            <a:endParaRPr lang="de-DE" dirty="0"/>
-          </a:p>
-          <a:p>
-            <a:pPr marL="0" marR="0" lvl="0" indent="0" algn="l" defTabSz="914400" rtl="0" eaLnBrk="1" fontAlgn="auto" latinLnBrk="0" hangingPunct="1">
-              <a:lnSpc>
-                <a:spcPct val="100000"/>
-              </a:lnSpc>
-              <a:spcBef>
-                <a:spcPts val="0"/>
-              </a:spcBef>
-              <a:spcAft>
-                <a:spcPts val="0"/>
-              </a:spcAft>
-              <a:buClrTx/>
-              <a:buSzTx/>
-              <a:buFontTx/>
-              <a:buNone/>
-              <a:tabLst/>
-              <a:defRPr/>
-            </a:pPr>
-            <a:r>
-              <a:rPr lang="de-DE" dirty="0"/>
-              <a:t>Bis 4 pro </a:t>
-            </a:r>
-            <a:r>
-              <a:rPr lang="de-DE" dirty="0" err="1"/>
-              <a:t>Raspi</a:t>
-            </a:r>
-            <a:endParaRPr lang="de-DE" dirty="0"/>
-          </a:p>
-          <a:p>
-            <a:endParaRPr lang="de-DE" dirty="0"/>
-          </a:p>
-          <a:p>
-            <a:r>
-              <a:rPr lang="de-DE" dirty="0"/>
-              <a:t>Pi06 – 18,75</a:t>
-            </a:r>
-          </a:p>
-          <a:p>
-            <a:r>
-              <a:rPr lang="de-DE" dirty="0"/>
-              <a:t>Stromversorgung</a:t>
-            </a:r>
-          </a:p>
-          <a:p>
-            <a:endParaRPr lang="de-DE" dirty="0"/>
-          </a:p>
-          <a:p>
-            <a:r>
-              <a:rPr lang="de-DE" dirty="0"/>
-              <a:t>GCA173 – 19,00</a:t>
-            </a:r>
-          </a:p>
-          <a:p>
-            <a:r>
-              <a:rPr lang="de-DE" dirty="0"/>
-              <a:t>8x Gleisbesetztmelder inkl. Hallsensor</a:t>
-            </a:r>
           </a:p>
         </p:txBody>
       </p:sp>
@@ -979,7 +855,7 @@
           <a:p>
             <a:fld id="{89028E9F-3905-4325-8FE4-24BE77D686F8}" type="datetimeFigureOut">
               <a:rPr lang="de-DE" smtClean="0"/>
-              <a:t>27.10.2019</a:t>
+              <a:t>12.01.2021</a:t>
             </a:fld>
             <a:endParaRPr lang="de-DE"/>
           </a:p>
@@ -1149,7 +1025,7 @@
           <a:p>
             <a:fld id="{89028E9F-3905-4325-8FE4-24BE77D686F8}" type="datetimeFigureOut">
               <a:rPr lang="de-DE" smtClean="0"/>
-              <a:t>27.10.2019</a:t>
+              <a:t>12.01.2021</a:t>
             </a:fld>
             <a:endParaRPr lang="de-DE"/>
           </a:p>
@@ -1329,7 +1205,7 @@
           <a:p>
             <a:fld id="{89028E9F-3905-4325-8FE4-24BE77D686F8}" type="datetimeFigureOut">
               <a:rPr lang="de-DE" smtClean="0"/>
-              <a:t>27.10.2019</a:t>
+              <a:t>12.01.2021</a:t>
             </a:fld>
             <a:endParaRPr lang="de-DE"/>
           </a:p>
@@ -1499,7 +1375,7 @@
           <a:p>
             <a:fld id="{89028E9F-3905-4325-8FE4-24BE77D686F8}" type="datetimeFigureOut">
               <a:rPr lang="de-DE" smtClean="0"/>
-              <a:t>27.10.2019</a:t>
+              <a:t>12.01.2021</a:t>
             </a:fld>
             <a:endParaRPr lang="de-DE"/>
           </a:p>
@@ -1743,7 +1619,7 @@
           <a:p>
             <a:fld id="{89028E9F-3905-4325-8FE4-24BE77D686F8}" type="datetimeFigureOut">
               <a:rPr lang="de-DE" smtClean="0"/>
-              <a:t>27.10.2019</a:t>
+              <a:t>12.01.2021</a:t>
             </a:fld>
             <a:endParaRPr lang="de-DE"/>
           </a:p>
@@ -1975,7 +1851,7 @@
           <a:p>
             <a:fld id="{89028E9F-3905-4325-8FE4-24BE77D686F8}" type="datetimeFigureOut">
               <a:rPr lang="de-DE" smtClean="0"/>
-              <a:t>27.10.2019</a:t>
+              <a:t>12.01.2021</a:t>
             </a:fld>
             <a:endParaRPr lang="de-DE"/>
           </a:p>
@@ -2342,7 +2218,7 @@
           <a:p>
             <a:fld id="{89028E9F-3905-4325-8FE4-24BE77D686F8}" type="datetimeFigureOut">
               <a:rPr lang="de-DE" smtClean="0"/>
-              <a:t>27.10.2019</a:t>
+              <a:t>12.01.2021</a:t>
             </a:fld>
             <a:endParaRPr lang="de-DE"/>
           </a:p>
@@ -2460,7 +2336,7 @@
           <a:p>
             <a:fld id="{89028E9F-3905-4325-8FE4-24BE77D686F8}" type="datetimeFigureOut">
               <a:rPr lang="de-DE" smtClean="0"/>
-              <a:t>27.10.2019</a:t>
+              <a:t>12.01.2021</a:t>
             </a:fld>
             <a:endParaRPr lang="de-DE"/>
           </a:p>
@@ -2555,7 +2431,7 @@
           <a:p>
             <a:fld id="{89028E9F-3905-4325-8FE4-24BE77D686F8}" type="datetimeFigureOut">
               <a:rPr lang="de-DE" smtClean="0"/>
-              <a:t>27.10.2019</a:t>
+              <a:t>12.01.2021</a:t>
             </a:fld>
             <a:endParaRPr lang="de-DE"/>
           </a:p>
@@ -2832,7 +2708,7 @@
           <a:p>
             <a:fld id="{89028E9F-3905-4325-8FE4-24BE77D686F8}" type="datetimeFigureOut">
               <a:rPr lang="de-DE" smtClean="0"/>
-              <a:t>27.10.2019</a:t>
+              <a:t>12.01.2021</a:t>
             </a:fld>
             <a:endParaRPr lang="de-DE"/>
           </a:p>
@@ -3089,7 +2965,7 @@
           <a:p>
             <a:fld id="{89028E9F-3905-4325-8FE4-24BE77D686F8}" type="datetimeFigureOut">
               <a:rPr lang="de-DE" smtClean="0"/>
-              <a:t>27.10.2019</a:t>
+              <a:t>12.01.2021</a:t>
             </a:fld>
             <a:endParaRPr lang="de-DE"/>
           </a:p>
@@ -3302,7 +3178,7 @@
           <a:p>
             <a:fld id="{89028E9F-3905-4325-8FE4-24BE77D686F8}" type="datetimeFigureOut">
               <a:rPr lang="de-DE" smtClean="0"/>
-              <a:t>27.10.2019</a:t>
+              <a:t>12.01.2021</a:t>
             </a:fld>
             <a:endParaRPr lang="de-DE"/>
           </a:p>
@@ -3707,128 +3583,12 @@
           <a:chExt cx="0" cy="0"/>
         </a:xfrm>
       </p:grpSpPr>
-      <p:cxnSp>
-        <p:nvCxnSpPr>
-          <p:cNvPr id="40" name="Straight Arrow Connector 39">
+      <p:grpSp>
+        <p:nvGrpSpPr>
+          <p:cNvPr id="37" name="Group 36">
             <a:extLst>
               <a:ext uri="{FF2B5EF4-FFF2-40B4-BE49-F238E27FC236}">
-                <a16:creationId xmlns:a16="http://schemas.microsoft.com/office/drawing/2014/main" id="{CF28C14C-B174-402C-87C6-4D29BDC8BD6B}"/>
-              </a:ext>
-            </a:extLst>
-          </p:cNvPr>
-          <p:cNvCxnSpPr>
-            <a:cxnSpLocks/>
-            <a:stCxn id="78" idx="2"/>
-            <a:endCxn id="62" idx="0"/>
-          </p:cNvCxnSpPr>
-          <p:nvPr/>
-        </p:nvCxnSpPr>
-        <p:spPr>
-          <a:xfrm>
-            <a:off x="2569189" y="2074782"/>
-            <a:ext cx="0" cy="296369"/>
-          </a:xfrm>
-          <a:prstGeom prst="straightConnector1">
-            <a:avLst/>
-          </a:prstGeom>
-          <a:ln w="19050" cap="rnd" cmpd="sng">
-            <a:solidFill>
-              <a:schemeClr val="tx1">
-                <a:lumMod val="50000"/>
-                <a:lumOff val="50000"/>
-              </a:schemeClr>
-            </a:solidFill>
-            <a:miter lim="800000"/>
-            <a:headEnd type="none" w="med" len="med"/>
-            <a:tailEnd type="none" w="med" len="med"/>
-          </a:ln>
-        </p:spPr>
-        <p:style>
-          <a:lnRef idx="1">
-            <a:schemeClr val="accent1"/>
-          </a:lnRef>
-          <a:fillRef idx="0">
-            <a:schemeClr val="accent1"/>
-          </a:fillRef>
-          <a:effectRef idx="0">
-            <a:schemeClr val="accent1"/>
-          </a:effectRef>
-          <a:fontRef idx="minor">
-            <a:schemeClr val="tx1"/>
-          </a:fontRef>
-        </p:style>
-      </p:cxnSp>
-      <p:sp>
-        <p:nvSpPr>
-          <p:cNvPr id="62" name="Rectangle: Rounded Corners 61">
-            <a:extLst>
-              <a:ext uri="{FF2B5EF4-FFF2-40B4-BE49-F238E27FC236}">
-                <a16:creationId xmlns:a16="http://schemas.microsoft.com/office/drawing/2014/main" id="{64426494-DB82-48D2-A2B5-0118FD07967B}"/>
-              </a:ext>
-            </a:extLst>
-          </p:cNvPr>
-          <p:cNvSpPr/>
-          <p:nvPr/>
-        </p:nvSpPr>
-        <p:spPr>
-          <a:xfrm>
-            <a:off x="2019360" y="2371151"/>
-            <a:ext cx="1099661" cy="527029"/>
-          </a:xfrm>
-          <a:prstGeom prst="roundRect">
-            <a:avLst/>
-          </a:prstGeom>
-          <a:ln>
-            <a:solidFill>
-              <a:schemeClr val="bg1">
-                <a:lumMod val="50000"/>
-              </a:schemeClr>
-            </a:solidFill>
-          </a:ln>
-        </p:spPr>
-        <p:style>
-          <a:lnRef idx="3">
-            <a:schemeClr val="lt1"/>
-          </a:lnRef>
-          <a:fillRef idx="1">
-            <a:schemeClr val="accent3"/>
-          </a:fillRef>
-          <a:effectRef idx="1">
-            <a:schemeClr val="accent3"/>
-          </a:effectRef>
-          <a:fontRef idx="minor">
-            <a:schemeClr val="lt1"/>
-          </a:fontRef>
-        </p:style>
-        <p:txBody>
-          <a:bodyPr rtlCol="0" anchor="ctr"/>
-          <a:lstStyle/>
-          <a:p>
-            <a:pPr algn="ctr"/>
-            <a:r>
-              <a:rPr lang="de-DE" sz="1400" dirty="0"/>
-              <a:t>Zentrale</a:t>
-            </a:r>
-          </a:p>
-          <a:p>
-            <a:pPr algn="ctr"/>
-            <a:r>
-              <a:rPr lang="de-DE" sz="1400" b="1" dirty="0" err="1"/>
-              <a:t>Roco</a:t>
-            </a:r>
-            <a:r>
-              <a:rPr lang="de-DE" sz="1400" b="1" dirty="0"/>
-              <a:t> Z21</a:t>
-            </a:r>
-          </a:p>
-        </p:txBody>
-      </p:sp>
-      <p:grpSp>
-        <p:nvGrpSpPr>
-          <p:cNvPr id="63" name="Group 62">
-            <a:extLst>
-              <a:ext uri="{FF2B5EF4-FFF2-40B4-BE49-F238E27FC236}">
-                <a16:creationId xmlns:a16="http://schemas.microsoft.com/office/drawing/2014/main" id="{A970E67F-4295-4D26-B5BD-761567807F28}"/>
+                <a16:creationId xmlns:a16="http://schemas.microsoft.com/office/drawing/2014/main" id="{85118A4E-320E-4E7B-9C11-6AF0B79B26FD}"/>
               </a:ext>
             </a:extLst>
           </p:cNvPr>
@@ -3837,10 +3597,10 @@
         </p:nvGrpSpPr>
         <p:grpSpPr>
           <a:xfrm>
-            <a:off x="7701854" y="1134664"/>
-            <a:ext cx="967495" cy="1088461"/>
-            <a:chOff x="9090905" y="4721073"/>
-            <a:chExt cx="967495" cy="1088461"/>
+            <a:off x="4067384" y="871952"/>
+            <a:ext cx="1139542" cy="1623150"/>
+            <a:chOff x="4083540" y="930351"/>
+            <a:chExt cx="1139542" cy="1623150"/>
           </a:xfrm>
         </p:grpSpPr>
         <p:sp>
@@ -3857,8 +3617,8 @@
           </p:nvSpPr>
           <p:spPr>
             <a:xfrm>
-              <a:off x="9090905" y="4721073"/>
-              <a:ext cx="967495" cy="1088461"/>
+              <a:off x="4083540" y="1059237"/>
+              <a:ext cx="1139542" cy="1494264"/>
             </a:xfrm>
             <a:prstGeom prst="roundRect">
               <a:avLst/>
@@ -3899,20 +3659,16 @@
             <a:p>
               <a:pPr algn="ctr"/>
               <a:r>
-                <a:rPr lang="de-DE" sz="1000" dirty="0" err="1"/>
-                <a:t>Rocrail</a:t>
-              </a:r>
-              <a:r>
                 <a:rPr lang="de-DE" sz="1000" dirty="0"/>
-                <a:t> Server</a:t>
+                <a:t>FHEM Server</a:t>
               </a:r>
             </a:p>
             <a:p>
               <a:pPr algn="ctr"/>
-              <a:r>
-                <a:rPr lang="de-DE" sz="1000" dirty="0" err="1"/>
-                <a:t>RocNetNode</a:t>
-              </a:r>
+              <a:endParaRPr lang="de-DE" sz="1000" dirty="0"/>
+            </a:p>
+            <a:p>
+              <a:pPr algn="ctr"/>
               <a:endParaRPr lang="de-DE" sz="900" dirty="0"/>
             </a:p>
           </p:txBody>
@@ -3946,7 +3702,7 @@
           </p:blipFill>
           <p:spPr bwMode="auto">
             <a:xfrm>
-              <a:off x="9387227" y="4784678"/>
+              <a:off x="4465885" y="1122842"/>
               <a:ext cx="374850" cy="446250"/>
             </a:xfrm>
             <a:prstGeom prst="rect">
@@ -3971,33 +3727,12 @@
             </a:extLst>
           </p:spPr>
         </p:pic>
-      </p:grpSp>
-      <p:grpSp>
-        <p:nvGrpSpPr>
-          <p:cNvPr id="66" name="Group 65">
-            <a:extLst>
-              <a:ext uri="{FF2B5EF4-FFF2-40B4-BE49-F238E27FC236}">
-                <a16:creationId xmlns:a16="http://schemas.microsoft.com/office/drawing/2014/main" id="{32C6C292-8CAF-4E30-A629-44B9B5F4263B}"/>
-              </a:ext>
-            </a:extLst>
-          </p:cNvPr>
-          <p:cNvGrpSpPr/>
-          <p:nvPr/>
-        </p:nvGrpSpPr>
-        <p:grpSpPr>
-          <a:xfrm>
-            <a:off x="1740452" y="3409738"/>
-            <a:ext cx="1665111" cy="352659"/>
-            <a:chOff x="5825290" y="3473753"/>
-            <a:chExt cx="1665111" cy="352658"/>
-          </a:xfrm>
-        </p:grpSpPr>
         <p:sp>
           <p:nvSpPr>
-            <p:cNvPr id="72" name="Rectangle: Rounded Corners 71">
+            <p:cNvPr id="58" name="Rectangle: Rounded Corners 57">
               <a:extLst>
                 <a:ext uri="{FF2B5EF4-FFF2-40B4-BE49-F238E27FC236}">
-                  <a16:creationId xmlns:a16="http://schemas.microsoft.com/office/drawing/2014/main" id="{63F06BEB-0BD2-4A65-A4C3-16D736164B4A}"/>
+                  <a16:creationId xmlns:a16="http://schemas.microsoft.com/office/drawing/2014/main" id="{3127CC9B-0A0E-4E15-95B1-2BCA7CE7D40B}"/>
                 </a:ext>
               </a:extLst>
             </p:cNvPr>
@@ -4006,13 +3741,15 @@
           </p:nvSpPr>
           <p:spPr>
             <a:xfrm>
-              <a:off x="5825290" y="3473753"/>
-              <a:ext cx="1665111" cy="352658"/>
+              <a:off x="4240542" y="930351"/>
+              <a:ext cx="825537" cy="112619"/>
             </a:xfrm>
             <a:prstGeom prst="roundRect">
               <a:avLst/>
             </a:prstGeom>
-            <a:noFill/>
+            <a:solidFill>
+              <a:srgbClr val="00B050"/>
+            </a:solidFill>
             <a:ln>
               <a:solidFill>
                 <a:schemeClr val="bg1">
@@ -4040,62 +3777,210 @@
             <a:lstStyle/>
             <a:p>
               <a:pPr algn="ctr"/>
-              <a:endParaRPr lang="de-DE" sz="1400" b="1" dirty="0"/>
+              <a:r>
+                <a:rPr lang="de-DE" sz="900" dirty="0">
+                  <a:solidFill>
+                    <a:schemeClr val="tx1">
+                      <a:lumMod val="65000"/>
+                      <a:lumOff val="35000"/>
+                    </a:schemeClr>
+                  </a:solidFill>
+                </a:rPr>
+                <a:t>192.168.1.99</a:t>
+              </a:r>
+              <a:endParaRPr lang="de-DE" sz="900" b="1" dirty="0">
+                <a:solidFill>
+                  <a:schemeClr val="tx1">
+                    <a:lumMod val="65000"/>
+                    <a:lumOff val="35000"/>
+                  </a:schemeClr>
+                </a:solidFill>
+              </a:endParaRPr>
             </a:p>
           </p:txBody>
         </p:sp>
-        <p:pic>
-          <p:nvPicPr>
-            <p:cNvPr id="1032" name="Picture 8" descr="Ãhnliches Foto">
-              <a:extLst>
-                <a:ext uri="{FF2B5EF4-FFF2-40B4-BE49-F238E27FC236}">
-                  <a16:creationId xmlns:a16="http://schemas.microsoft.com/office/drawing/2014/main" id="{0530D918-7F94-4277-A886-1957187E8110}"/>
-                </a:ext>
-              </a:extLst>
-            </p:cNvPr>
-            <p:cNvPicPr>
-              <a:picLocks noChangeAspect="1" noChangeArrowheads="1"/>
-            </p:cNvPicPr>
-            <p:nvPr/>
-          </p:nvPicPr>
-          <p:blipFill rotWithShape="1">
-            <a:blip r:embed="rId4">
-              <a:extLst>
-                <a:ext uri="{28A0092B-C50C-407E-A947-70E740481C1C}">
-                  <a14:useLocalDpi xmlns:a14="http://schemas.microsoft.com/office/drawing/2010/main" val="0"/>
-                </a:ext>
-              </a:extLst>
-            </a:blip>
-            <a:srcRect t="24430" b="27393"/>
-            <a:stretch/>
-          </p:blipFill>
-          <p:spPr bwMode="auto">
-            <a:xfrm>
-              <a:off x="5928856" y="3519452"/>
-              <a:ext cx="1465462" cy="261258"/>
-            </a:xfrm>
-            <a:prstGeom prst="rect">
-              <a:avLst/>
-            </a:prstGeom>
-            <a:noFill/>
+      </p:grpSp>
+      <p:sp>
+        <p:nvSpPr>
+          <p:cNvPr id="147" name="Rectangle: Rounded Corners 146">
             <a:extLst>
-              <a:ext uri="{909E8E84-426E-40DD-AFC4-6F175D3DCCD1}">
-                <a14:hiddenFill xmlns:a14="http://schemas.microsoft.com/office/drawing/2010/main">
-                  <a:solidFill>
-                    <a:srgbClr val="FFFFFF"/>
-                  </a:solidFill>
-                </a14:hiddenFill>
+              <a:ext uri="{FF2B5EF4-FFF2-40B4-BE49-F238E27FC236}">
+                <a16:creationId xmlns:a16="http://schemas.microsoft.com/office/drawing/2014/main" id="{8633036C-360A-49A2-BEA4-6F0DF7C072A3}"/>
               </a:ext>
             </a:extLst>
-          </p:spPr>
-        </p:pic>
-      </p:grpSp>
+          </p:cNvPr>
+          <p:cNvSpPr/>
+          <p:nvPr/>
+        </p:nvSpPr>
+        <p:spPr>
+          <a:xfrm>
+            <a:off x="5742523" y="1038704"/>
+            <a:ext cx="1300178" cy="361951"/>
+          </a:xfrm>
+          <a:prstGeom prst="roundRect">
+            <a:avLst/>
+          </a:prstGeom>
+          <a:ln>
+            <a:solidFill>
+              <a:schemeClr val="bg1">
+                <a:lumMod val="50000"/>
+              </a:schemeClr>
+            </a:solidFill>
+          </a:ln>
+        </p:spPr>
+        <p:style>
+          <a:lnRef idx="3">
+            <a:schemeClr val="lt1"/>
+          </a:lnRef>
+          <a:fillRef idx="1">
+            <a:schemeClr val="accent3"/>
+          </a:fillRef>
+          <a:effectRef idx="1">
+            <a:schemeClr val="accent3"/>
+          </a:effectRef>
+          <a:fontRef idx="minor">
+            <a:schemeClr val="lt1"/>
+          </a:fontRef>
+        </p:style>
+        <p:txBody>
+          <a:bodyPr rtlCol="0" anchor="ctr"/>
+          <a:lstStyle/>
+          <a:p>
+            <a:pPr algn="ctr"/>
+            <a:r>
+              <a:rPr lang="de-DE" sz="1200" dirty="0"/>
+              <a:t>RFXtrx433</a:t>
+            </a:r>
+          </a:p>
+          <a:p>
+            <a:pPr algn="ctr"/>
+            <a:r>
+              <a:rPr lang="de-DE" sz="1200" dirty="0"/>
+              <a:t>433Mhz</a:t>
+            </a:r>
+          </a:p>
+        </p:txBody>
+      </p:sp>
+      <p:pic>
+        <p:nvPicPr>
+          <p:cNvPr id="2" name="Picture 1">
+            <a:extLst>
+              <a:ext uri="{FF2B5EF4-FFF2-40B4-BE49-F238E27FC236}">
+                <a16:creationId xmlns:a16="http://schemas.microsoft.com/office/drawing/2014/main" id="{6B141590-2CAF-4AB7-86BC-42C72306A92A}"/>
+              </a:ext>
+            </a:extLst>
+          </p:cNvPr>
+          <p:cNvPicPr>
+            <a:picLocks noChangeAspect="1"/>
+          </p:cNvPicPr>
+          <p:nvPr/>
+        </p:nvPicPr>
+        <p:blipFill>
+          <a:blip r:embed="rId4"/>
+          <a:stretch>
+            <a:fillRect/>
+          </a:stretch>
+        </p:blipFill>
+        <p:spPr>
+          <a:xfrm rot="16200000">
+            <a:off x="5248703" y="977935"/>
+            <a:ext cx="483489" cy="483489"/>
+          </a:xfrm>
+          <a:prstGeom prst="rect">
+            <a:avLst/>
+          </a:prstGeom>
+        </p:spPr>
+      </p:pic>
+      <p:sp>
+        <p:nvSpPr>
+          <p:cNvPr id="82" name="Rectangle: Rounded Corners 81">
+            <a:extLst>
+              <a:ext uri="{FF2B5EF4-FFF2-40B4-BE49-F238E27FC236}">
+                <a16:creationId xmlns:a16="http://schemas.microsoft.com/office/drawing/2014/main" id="{DCDB0442-E480-4DC5-B6E9-FDE81F2C416E}"/>
+              </a:ext>
+            </a:extLst>
+          </p:cNvPr>
+          <p:cNvSpPr/>
+          <p:nvPr/>
+        </p:nvSpPr>
+        <p:spPr>
+          <a:xfrm>
+            <a:off x="5742523" y="1484093"/>
+            <a:ext cx="1300178" cy="361951"/>
+          </a:xfrm>
+          <a:prstGeom prst="roundRect">
+            <a:avLst/>
+          </a:prstGeom>
+          <a:ln>
+            <a:solidFill>
+              <a:schemeClr val="bg1">
+                <a:lumMod val="50000"/>
+              </a:schemeClr>
+            </a:solidFill>
+          </a:ln>
+        </p:spPr>
+        <p:style>
+          <a:lnRef idx="3">
+            <a:schemeClr val="lt1"/>
+          </a:lnRef>
+          <a:fillRef idx="1">
+            <a:schemeClr val="accent3"/>
+          </a:fillRef>
+          <a:effectRef idx="1">
+            <a:schemeClr val="accent3"/>
+          </a:effectRef>
+          <a:fontRef idx="minor">
+            <a:schemeClr val="lt1"/>
+          </a:fontRef>
+        </p:style>
+        <p:txBody>
+          <a:bodyPr rtlCol="0" anchor="ctr"/>
+          <a:lstStyle/>
+          <a:p>
+            <a:pPr algn="ctr"/>
+            <a:r>
+              <a:rPr lang="de-DE" sz="1200" dirty="0"/>
+              <a:t>CUL MAX</a:t>
+            </a:r>
+          </a:p>
+        </p:txBody>
+      </p:sp>
+      <p:pic>
+        <p:nvPicPr>
+          <p:cNvPr id="83" name="Picture 82">
+            <a:extLst>
+              <a:ext uri="{FF2B5EF4-FFF2-40B4-BE49-F238E27FC236}">
+                <a16:creationId xmlns:a16="http://schemas.microsoft.com/office/drawing/2014/main" id="{187CC2B2-C02F-45DA-A3DB-0748369E614E}"/>
+              </a:ext>
+            </a:extLst>
+          </p:cNvPr>
+          <p:cNvPicPr>
+            <a:picLocks noChangeAspect="1"/>
+          </p:cNvPicPr>
+          <p:nvPr/>
+        </p:nvPicPr>
+        <p:blipFill>
+          <a:blip r:embed="rId4"/>
+          <a:stretch>
+            <a:fillRect/>
+          </a:stretch>
+        </p:blipFill>
+        <p:spPr>
+          <a:xfrm rot="16200000">
+            <a:off x="5248703" y="1423324"/>
+            <a:ext cx="483489" cy="483489"/>
+          </a:xfrm>
+          <a:prstGeom prst="rect">
+            <a:avLst/>
+          </a:prstGeom>
+        </p:spPr>
+      </p:pic>
       <p:grpSp>
         <p:nvGrpSpPr>
-          <p:cNvPr id="68" name="Group 67">
+          <p:cNvPr id="47" name="Group 46">
             <a:extLst>
               <a:ext uri="{FF2B5EF4-FFF2-40B4-BE49-F238E27FC236}">
-                <a16:creationId xmlns:a16="http://schemas.microsoft.com/office/drawing/2014/main" id="{8A0384B8-F748-442D-B729-00268AAA74BE}"/>
+                <a16:creationId xmlns:a16="http://schemas.microsoft.com/office/drawing/2014/main" id="{9383672C-A105-4D91-BEF1-6B01F4DD454B}"/>
               </a:ext>
             </a:extLst>
           </p:cNvPr>
@@ -4104,65 +3989,18 @@
         </p:nvGrpSpPr>
         <p:grpSpPr>
           <a:xfrm>
-            <a:off x="2196927" y="1285865"/>
-            <a:ext cx="752156" cy="788916"/>
-            <a:chOff x="8179470" y="1576149"/>
-            <a:chExt cx="752156" cy="788916"/>
+            <a:off x="2201718" y="1868092"/>
+            <a:ext cx="1300178" cy="627587"/>
+            <a:chOff x="2201718" y="1868092"/>
+            <a:chExt cx="1300178" cy="627587"/>
           </a:xfrm>
         </p:grpSpPr>
-        <p:pic>
-          <p:nvPicPr>
-            <p:cNvPr id="1026" name="Picture 2" descr="http://clipart-library.com/image_gallery/236717.png">
+        <p:sp>
+          <p:nvSpPr>
+            <p:cNvPr id="96" name="Rectangle: Rounded Corners 95">
               <a:extLst>
                 <a:ext uri="{FF2B5EF4-FFF2-40B4-BE49-F238E27FC236}">
-                  <a16:creationId xmlns:a16="http://schemas.microsoft.com/office/drawing/2014/main" id="{11F3E943-E24E-4916-80B8-6BEB29EFB965}"/>
-                </a:ext>
-              </a:extLst>
-            </p:cNvPr>
-            <p:cNvPicPr>
-              <a:picLocks noChangeAspect="1" noChangeArrowheads="1"/>
-            </p:cNvPicPr>
-            <p:nvPr/>
-          </p:nvPicPr>
-          <p:blipFill>
-            <a:blip r:embed="rId5">
-              <a:extLst>
-                <a:ext uri="{28A0092B-C50C-407E-A947-70E740481C1C}">
-                  <a14:useLocalDpi xmlns:a14="http://schemas.microsoft.com/office/drawing/2010/main" val="0"/>
-                </a:ext>
-              </a:extLst>
-            </a:blip>
-            <a:srcRect/>
-            <a:stretch>
-              <a:fillRect/>
-            </a:stretch>
-          </p:blipFill>
-          <p:spPr bwMode="auto">
-            <a:xfrm>
-              <a:off x="8183377" y="1595054"/>
-              <a:ext cx="748249" cy="748249"/>
-            </a:xfrm>
-            <a:prstGeom prst="rect">
-              <a:avLst/>
-            </a:prstGeom>
-            <a:noFill/>
-            <a:extLst>
-              <a:ext uri="{909E8E84-426E-40DD-AFC4-6F175D3DCCD1}">
-                <a14:hiddenFill xmlns:a14="http://schemas.microsoft.com/office/drawing/2010/main">
-                  <a:solidFill>
-                    <a:srgbClr val="FFFFFF"/>
-                  </a:solidFill>
-                </a14:hiddenFill>
-              </a:ext>
-            </a:extLst>
-          </p:spPr>
-        </p:pic>
-        <p:sp>
-          <p:nvSpPr>
-            <p:cNvPr id="78" name="Rectangle: Rounded Corners 77">
-              <a:extLst>
-                <a:ext uri="{FF2B5EF4-FFF2-40B4-BE49-F238E27FC236}">
-                  <a16:creationId xmlns:a16="http://schemas.microsoft.com/office/drawing/2014/main" id="{340E5BA3-AF4F-4A63-B96F-957E74606513}"/>
+                  <a16:creationId xmlns:a16="http://schemas.microsoft.com/office/drawing/2014/main" id="{32788603-2701-4428-AAAA-C8E4A3225541}"/>
                 </a:ext>
               </a:extLst>
             </p:cNvPr>
@@ -4171,13 +4009,12 @@
           </p:nvSpPr>
           <p:spPr>
             <a:xfrm>
-              <a:off x="8179470" y="1576149"/>
-              <a:ext cx="744524" cy="788916"/>
+              <a:off x="2201718" y="1990497"/>
+              <a:ext cx="1300178" cy="505182"/>
             </a:xfrm>
             <a:prstGeom prst="roundRect">
               <a:avLst/>
             </a:prstGeom>
-            <a:noFill/>
             <a:ln>
               <a:solidFill>
                 <a:schemeClr val="bg1">
@@ -4205,31 +4042,1294 @@
             <a:lstStyle/>
             <a:p>
               <a:pPr algn="ctr"/>
-              <a:endParaRPr lang="de-DE" sz="1400" b="1" dirty="0"/>
+              <a:r>
+                <a:rPr lang="de-DE" sz="1400" dirty="0" err="1"/>
+                <a:t>Homematic</a:t>
+              </a:r>
+              <a:endParaRPr lang="de-DE" sz="1400" dirty="0"/>
+            </a:p>
+            <a:p>
+              <a:pPr algn="ctr"/>
+              <a:r>
+                <a:rPr lang="de-DE" sz="1400" dirty="0"/>
+                <a:t>HMCC</a:t>
+              </a:r>
+            </a:p>
+          </p:txBody>
+        </p:sp>
+        <p:sp>
+          <p:nvSpPr>
+            <p:cNvPr id="98" name="Rectangle: Rounded Corners 97">
+              <a:extLst>
+                <a:ext uri="{FF2B5EF4-FFF2-40B4-BE49-F238E27FC236}">
+                  <a16:creationId xmlns:a16="http://schemas.microsoft.com/office/drawing/2014/main" id="{0CF37874-6E53-4971-977B-AEA0397979AF}"/>
+                </a:ext>
+              </a:extLst>
+            </p:cNvPr>
+            <p:cNvSpPr/>
+            <p:nvPr/>
+          </p:nvSpPr>
+          <p:spPr>
+            <a:xfrm>
+              <a:off x="2416450" y="1868092"/>
+              <a:ext cx="870714" cy="112619"/>
+            </a:xfrm>
+            <a:prstGeom prst="roundRect">
+              <a:avLst/>
+            </a:prstGeom>
+            <a:solidFill>
+              <a:srgbClr val="00B050"/>
+            </a:solidFill>
+            <a:ln>
+              <a:solidFill>
+                <a:schemeClr val="bg1">
+                  <a:lumMod val="50000"/>
+                </a:schemeClr>
+              </a:solidFill>
+            </a:ln>
+          </p:spPr>
+          <p:style>
+            <a:lnRef idx="3">
+              <a:schemeClr val="lt1"/>
+            </a:lnRef>
+            <a:fillRef idx="1">
+              <a:schemeClr val="accent3"/>
+            </a:fillRef>
+            <a:effectRef idx="1">
+              <a:schemeClr val="accent3"/>
+            </a:effectRef>
+            <a:fontRef idx="minor">
+              <a:schemeClr val="lt1"/>
+            </a:fontRef>
+          </p:style>
+          <p:txBody>
+            <a:bodyPr rtlCol="0" anchor="ctr"/>
+            <a:lstStyle/>
+            <a:p>
+              <a:pPr algn="ctr"/>
+              <a:r>
+                <a:rPr lang="de-DE" sz="900" dirty="0">
+                  <a:solidFill>
+                    <a:schemeClr val="tx1">
+                      <a:lumMod val="65000"/>
+                      <a:lumOff val="35000"/>
+                    </a:schemeClr>
+                  </a:solidFill>
+                </a:rPr>
+                <a:t>192.168.1.98</a:t>
+              </a:r>
+              <a:endParaRPr lang="de-DE" sz="900" b="1" dirty="0">
+                <a:solidFill>
+                  <a:schemeClr val="tx1">
+                    <a:lumMod val="65000"/>
+                    <a:lumOff val="35000"/>
+                  </a:schemeClr>
+                </a:solidFill>
+              </a:endParaRPr>
             </a:p>
           </p:txBody>
         </p:sp>
       </p:grpSp>
+      <p:grpSp>
+        <p:nvGrpSpPr>
+          <p:cNvPr id="99" name="Group 98">
+            <a:extLst>
+              <a:ext uri="{FF2B5EF4-FFF2-40B4-BE49-F238E27FC236}">
+                <a16:creationId xmlns:a16="http://schemas.microsoft.com/office/drawing/2014/main" id="{9C5BFEB4-7F9B-4CAE-A9AA-B38A57E9D398}"/>
+              </a:ext>
+            </a:extLst>
+          </p:cNvPr>
+          <p:cNvGrpSpPr/>
+          <p:nvPr/>
+        </p:nvGrpSpPr>
+        <p:grpSpPr>
+          <a:xfrm>
+            <a:off x="2201718" y="605958"/>
+            <a:ext cx="1300178" cy="627587"/>
+            <a:chOff x="3560952" y="2135188"/>
+            <a:chExt cx="1300178" cy="627587"/>
+          </a:xfrm>
+        </p:grpSpPr>
+        <p:sp>
+          <p:nvSpPr>
+            <p:cNvPr id="100" name="Rectangle: Rounded Corners 99">
+              <a:extLst>
+                <a:ext uri="{FF2B5EF4-FFF2-40B4-BE49-F238E27FC236}">
+                  <a16:creationId xmlns:a16="http://schemas.microsoft.com/office/drawing/2014/main" id="{A676D031-1020-4908-86BE-410C6ADDC150}"/>
+                </a:ext>
+              </a:extLst>
+            </p:cNvPr>
+            <p:cNvSpPr/>
+            <p:nvPr/>
+          </p:nvSpPr>
+          <p:spPr>
+            <a:xfrm>
+              <a:off x="3560952" y="2257593"/>
+              <a:ext cx="1300178" cy="505182"/>
+            </a:xfrm>
+            <a:prstGeom prst="roundRect">
+              <a:avLst/>
+            </a:prstGeom>
+            <a:ln>
+              <a:solidFill>
+                <a:schemeClr val="bg1">
+                  <a:lumMod val="50000"/>
+                </a:schemeClr>
+              </a:solidFill>
+            </a:ln>
+          </p:spPr>
+          <p:style>
+            <a:lnRef idx="3">
+              <a:schemeClr val="lt1"/>
+            </a:lnRef>
+            <a:fillRef idx="1">
+              <a:schemeClr val="accent3"/>
+            </a:fillRef>
+            <a:effectRef idx="1">
+              <a:schemeClr val="accent3"/>
+            </a:effectRef>
+            <a:fontRef idx="minor">
+              <a:schemeClr val="lt1"/>
+            </a:fontRef>
+          </p:style>
+          <p:txBody>
+            <a:bodyPr rtlCol="0" anchor="ctr"/>
+            <a:lstStyle/>
+            <a:p>
+              <a:pPr algn="ctr"/>
+              <a:r>
+                <a:rPr lang="de-DE" sz="1400" dirty="0"/>
+                <a:t>KNX</a:t>
+              </a:r>
+            </a:p>
+            <a:p>
+              <a:pPr algn="ctr"/>
+              <a:r>
+                <a:rPr lang="de-DE" sz="1400" dirty="0"/>
+                <a:t>1.1.74</a:t>
+              </a:r>
+            </a:p>
+          </p:txBody>
+        </p:sp>
+        <p:sp>
+          <p:nvSpPr>
+            <p:cNvPr id="101" name="Rectangle: Rounded Corners 100">
+              <a:extLst>
+                <a:ext uri="{FF2B5EF4-FFF2-40B4-BE49-F238E27FC236}">
+                  <a16:creationId xmlns:a16="http://schemas.microsoft.com/office/drawing/2014/main" id="{2B743DAA-EA53-4ADD-8840-AF6F93B8FA8E}"/>
+                </a:ext>
+              </a:extLst>
+            </p:cNvPr>
+            <p:cNvSpPr/>
+            <p:nvPr/>
+          </p:nvSpPr>
+          <p:spPr>
+            <a:xfrm>
+              <a:off x="3775684" y="2135188"/>
+              <a:ext cx="870714" cy="112619"/>
+            </a:xfrm>
+            <a:prstGeom prst="roundRect">
+              <a:avLst/>
+            </a:prstGeom>
+            <a:solidFill>
+              <a:srgbClr val="00B050"/>
+            </a:solidFill>
+            <a:ln>
+              <a:solidFill>
+                <a:schemeClr val="bg1">
+                  <a:lumMod val="50000"/>
+                </a:schemeClr>
+              </a:solidFill>
+            </a:ln>
+          </p:spPr>
+          <p:style>
+            <a:lnRef idx="3">
+              <a:schemeClr val="lt1"/>
+            </a:lnRef>
+            <a:fillRef idx="1">
+              <a:schemeClr val="accent3"/>
+            </a:fillRef>
+            <a:effectRef idx="1">
+              <a:schemeClr val="accent3"/>
+            </a:effectRef>
+            <a:fontRef idx="minor">
+              <a:schemeClr val="lt1"/>
+            </a:fontRef>
+          </p:style>
+          <p:txBody>
+            <a:bodyPr rtlCol="0" anchor="ctr"/>
+            <a:lstStyle/>
+            <a:p>
+              <a:pPr algn="ctr"/>
+              <a:r>
+                <a:rPr lang="de-DE" sz="900" dirty="0">
+                  <a:solidFill>
+                    <a:schemeClr val="tx1">
+                      <a:lumMod val="65000"/>
+                      <a:lumOff val="35000"/>
+                    </a:schemeClr>
+                  </a:solidFill>
+                </a:rPr>
+                <a:t>192.168.1.111</a:t>
+              </a:r>
+              <a:endParaRPr lang="de-DE" sz="900" b="1" dirty="0">
+                <a:solidFill>
+                  <a:schemeClr val="tx1">
+                    <a:lumMod val="65000"/>
+                    <a:lumOff val="35000"/>
+                  </a:schemeClr>
+                </a:solidFill>
+              </a:endParaRPr>
+            </a:p>
+          </p:txBody>
+        </p:sp>
+      </p:grpSp>
+      <p:grpSp>
+        <p:nvGrpSpPr>
+          <p:cNvPr id="33" name="Group 32">
+            <a:extLst>
+              <a:ext uri="{FF2B5EF4-FFF2-40B4-BE49-F238E27FC236}">
+                <a16:creationId xmlns:a16="http://schemas.microsoft.com/office/drawing/2014/main" id="{E7404CA3-D57F-4771-A0BA-0BBE66FD8274}"/>
+              </a:ext>
+            </a:extLst>
+          </p:cNvPr>
+          <p:cNvGrpSpPr/>
+          <p:nvPr/>
+        </p:nvGrpSpPr>
+        <p:grpSpPr>
+          <a:xfrm>
+            <a:off x="5248703" y="1929052"/>
+            <a:ext cx="1802480" cy="627587"/>
+            <a:chOff x="2065176" y="3305853"/>
+            <a:chExt cx="1802480" cy="627587"/>
+          </a:xfrm>
+        </p:grpSpPr>
+        <p:pic>
+          <p:nvPicPr>
+            <p:cNvPr id="131" name="Picture 130">
+              <a:extLst>
+                <a:ext uri="{FF2B5EF4-FFF2-40B4-BE49-F238E27FC236}">
+                  <a16:creationId xmlns:a16="http://schemas.microsoft.com/office/drawing/2014/main" id="{B5253FC8-D37E-40F7-9595-623116346877}"/>
+                </a:ext>
+              </a:extLst>
+            </p:cNvPr>
+            <p:cNvPicPr>
+              <a:picLocks noChangeAspect="1"/>
+            </p:cNvPicPr>
+            <p:nvPr/>
+          </p:nvPicPr>
+          <p:blipFill>
+            <a:blip r:embed="rId4"/>
+            <a:stretch>
+              <a:fillRect/>
+            </a:stretch>
+          </p:blipFill>
+          <p:spPr>
+            <a:xfrm rot="16200000">
+              <a:off x="2065176" y="3449951"/>
+              <a:ext cx="483489" cy="483489"/>
+            </a:xfrm>
+            <a:prstGeom prst="rect">
+              <a:avLst/>
+            </a:prstGeom>
+          </p:spPr>
+        </p:pic>
+        <p:grpSp>
+          <p:nvGrpSpPr>
+            <p:cNvPr id="102" name="Group 101">
+              <a:extLst>
+                <a:ext uri="{FF2B5EF4-FFF2-40B4-BE49-F238E27FC236}">
+                  <a16:creationId xmlns:a16="http://schemas.microsoft.com/office/drawing/2014/main" id="{7AAC5EE7-9184-4773-8B95-CF9C2D621FDD}"/>
+                </a:ext>
+              </a:extLst>
+            </p:cNvPr>
+            <p:cNvGrpSpPr/>
+            <p:nvPr/>
+          </p:nvGrpSpPr>
+          <p:grpSpPr>
+            <a:xfrm>
+              <a:off x="2567478" y="3305853"/>
+              <a:ext cx="1300178" cy="627587"/>
+              <a:chOff x="3560952" y="2135188"/>
+              <a:chExt cx="1300178" cy="627587"/>
+            </a:xfrm>
+          </p:grpSpPr>
+          <p:sp>
+            <p:nvSpPr>
+              <p:cNvPr id="104" name="Rectangle: Rounded Corners 103">
+                <a:extLst>
+                  <a:ext uri="{FF2B5EF4-FFF2-40B4-BE49-F238E27FC236}">
+                    <a16:creationId xmlns:a16="http://schemas.microsoft.com/office/drawing/2014/main" id="{805250D8-82FF-44F5-99FF-D2835D0A6B6C}"/>
+                  </a:ext>
+                </a:extLst>
+              </p:cNvPr>
+              <p:cNvSpPr/>
+              <p:nvPr/>
+            </p:nvSpPr>
+            <p:spPr>
+              <a:xfrm>
+                <a:off x="3560952" y="2257593"/>
+                <a:ext cx="1300178" cy="505182"/>
+              </a:xfrm>
+              <a:prstGeom prst="roundRect">
+                <a:avLst/>
+              </a:prstGeom>
+              <a:ln>
+                <a:solidFill>
+                  <a:schemeClr val="bg1">
+                    <a:lumMod val="50000"/>
+                  </a:schemeClr>
+                </a:solidFill>
+              </a:ln>
+            </p:spPr>
+            <p:style>
+              <a:lnRef idx="3">
+                <a:schemeClr val="lt1"/>
+              </a:lnRef>
+              <a:fillRef idx="1">
+                <a:schemeClr val="accent3"/>
+              </a:fillRef>
+              <a:effectRef idx="1">
+                <a:schemeClr val="accent3"/>
+              </a:effectRef>
+              <a:fontRef idx="minor">
+                <a:schemeClr val="lt1"/>
+              </a:fontRef>
+            </p:style>
+            <p:txBody>
+              <a:bodyPr rtlCol="0" anchor="ctr"/>
+              <a:lstStyle/>
+              <a:p>
+                <a:pPr algn="ctr"/>
+                <a:r>
+                  <a:rPr lang="de-DE" sz="1400" dirty="0" err="1"/>
+                  <a:t>Conbee</a:t>
+                </a:r>
+                <a:r>
+                  <a:rPr lang="de-DE" sz="1400" dirty="0"/>
+                  <a:t> II</a:t>
+                </a:r>
+              </a:p>
+              <a:p>
+                <a:pPr algn="ctr"/>
+                <a:r>
+                  <a:rPr lang="de-DE" sz="1400" dirty="0" err="1"/>
+                  <a:t>Hue</a:t>
+                </a:r>
+                <a:r>
+                  <a:rPr lang="de-DE" sz="1400" dirty="0"/>
+                  <a:t> / </a:t>
+                </a:r>
+                <a:r>
+                  <a:rPr lang="de-DE" sz="1400" dirty="0" err="1"/>
+                  <a:t>Zigbee</a:t>
+                </a:r>
+                <a:endParaRPr lang="de-DE" sz="1400" dirty="0"/>
+              </a:p>
+            </p:txBody>
+          </p:sp>
+          <p:sp>
+            <p:nvSpPr>
+              <p:cNvPr id="106" name="Rectangle: Rounded Corners 105">
+                <a:extLst>
+                  <a:ext uri="{FF2B5EF4-FFF2-40B4-BE49-F238E27FC236}">
+                    <a16:creationId xmlns:a16="http://schemas.microsoft.com/office/drawing/2014/main" id="{16562B05-052F-4AD0-875A-538E3CF48E76}"/>
+                  </a:ext>
+                </a:extLst>
+              </p:cNvPr>
+              <p:cNvSpPr/>
+              <p:nvPr/>
+            </p:nvSpPr>
+            <p:spPr>
+              <a:xfrm>
+                <a:off x="3775684" y="2135188"/>
+                <a:ext cx="870714" cy="112619"/>
+              </a:xfrm>
+              <a:prstGeom prst="roundRect">
+                <a:avLst/>
+              </a:prstGeom>
+              <a:solidFill>
+                <a:srgbClr val="00B050"/>
+              </a:solidFill>
+              <a:ln>
+                <a:solidFill>
+                  <a:schemeClr val="bg1">
+                    <a:lumMod val="50000"/>
+                  </a:schemeClr>
+                </a:solidFill>
+              </a:ln>
+            </p:spPr>
+            <p:style>
+              <a:lnRef idx="3">
+                <a:schemeClr val="lt1"/>
+              </a:lnRef>
+              <a:fillRef idx="1">
+                <a:schemeClr val="accent3"/>
+              </a:fillRef>
+              <a:effectRef idx="1">
+                <a:schemeClr val="accent3"/>
+              </a:effectRef>
+              <a:fontRef idx="minor">
+                <a:schemeClr val="lt1"/>
+              </a:fontRef>
+            </p:style>
+            <p:txBody>
+              <a:bodyPr rtlCol="0" anchor="ctr"/>
+              <a:lstStyle/>
+              <a:p>
+                <a:pPr algn="ctr"/>
+                <a:r>
+                  <a:rPr lang="de-DE" sz="900" dirty="0">
+                    <a:solidFill>
+                      <a:schemeClr val="tx1">
+                        <a:lumMod val="65000"/>
+                        <a:lumOff val="35000"/>
+                      </a:schemeClr>
+                    </a:solidFill>
+                  </a:rPr>
+                  <a:t>192.168.1.99</a:t>
+                </a:r>
+                <a:endParaRPr lang="de-DE" sz="900" b="1" dirty="0">
+                  <a:solidFill>
+                    <a:schemeClr val="tx1">
+                      <a:lumMod val="65000"/>
+                      <a:lumOff val="35000"/>
+                    </a:schemeClr>
+                  </a:solidFill>
+                </a:endParaRPr>
+              </a:p>
+            </p:txBody>
+          </p:sp>
+        </p:grpSp>
+      </p:grpSp>
       <p:cxnSp>
         <p:nvCxnSpPr>
-          <p:cNvPr id="85" name="Straight Arrow Connector 84">
+          <p:cNvPr id="11" name="Connector: Elbow 10">
             <a:extLst>
               <a:ext uri="{FF2B5EF4-FFF2-40B4-BE49-F238E27FC236}">
-                <a16:creationId xmlns:a16="http://schemas.microsoft.com/office/drawing/2014/main" id="{9BF8D462-EC99-4E44-82F3-64FB011E1469}"/>
+                <a16:creationId xmlns:a16="http://schemas.microsoft.com/office/drawing/2014/main" id="{6A5ED0EC-7EE4-4193-973D-7A695D04C101}"/>
               </a:ext>
             </a:extLst>
           </p:cNvPr>
           <p:cNvCxnSpPr>
             <a:cxnSpLocks/>
-            <a:stCxn id="72" idx="0"/>
-            <a:endCxn id="62" idx="2"/>
+            <a:stCxn id="69" idx="1"/>
+            <a:endCxn id="100" idx="3"/>
           </p:cNvCxnSpPr>
           <p:nvPr/>
         </p:nvCxnSpPr>
         <p:spPr>
-          <a:xfrm flipH="1" flipV="1">
-            <a:off x="2569191" y="2898180"/>
-            <a:ext cx="3817" cy="511559"/>
+          <a:xfrm rot="10800000">
+            <a:off x="3501896" y="980954"/>
+            <a:ext cx="565488" cy="767016"/>
+          </a:xfrm>
+          <a:prstGeom prst="bentConnector3">
+            <a:avLst/>
+          </a:prstGeom>
+          <a:ln w="19050" cap="rnd" cmpd="sng">
+            <a:solidFill>
+              <a:schemeClr val="tx1">
+                <a:lumMod val="50000"/>
+                <a:lumOff val="50000"/>
+              </a:schemeClr>
+            </a:solidFill>
+            <a:miter lim="800000"/>
+            <a:headEnd type="none" w="med" len="med"/>
+            <a:tailEnd type="none" w="med" len="med"/>
+          </a:ln>
+        </p:spPr>
+        <p:style>
+          <a:lnRef idx="1">
+            <a:schemeClr val="accent1"/>
+          </a:lnRef>
+          <a:fillRef idx="0">
+            <a:schemeClr val="accent1"/>
+          </a:fillRef>
+          <a:effectRef idx="0">
+            <a:schemeClr val="accent1"/>
+          </a:effectRef>
+          <a:fontRef idx="minor">
+            <a:schemeClr val="tx1"/>
+          </a:fontRef>
+        </p:style>
+      </p:cxnSp>
+      <p:cxnSp>
+        <p:nvCxnSpPr>
+          <p:cNvPr id="107" name="Connector: Elbow 106">
+            <a:extLst>
+              <a:ext uri="{FF2B5EF4-FFF2-40B4-BE49-F238E27FC236}">
+                <a16:creationId xmlns:a16="http://schemas.microsoft.com/office/drawing/2014/main" id="{D857FB7A-147E-415A-924B-D601E6703393}"/>
+              </a:ext>
+            </a:extLst>
+          </p:cNvPr>
+          <p:cNvCxnSpPr>
+            <a:cxnSpLocks/>
+            <a:stCxn id="69" idx="1"/>
+            <a:endCxn id="96" idx="3"/>
+          </p:cNvCxnSpPr>
+          <p:nvPr/>
+        </p:nvCxnSpPr>
+        <p:spPr>
+          <a:xfrm rot="10800000" flipV="1">
+            <a:off x="3501896" y="1747970"/>
+            <a:ext cx="565488" cy="495118"/>
+          </a:xfrm>
+          <a:prstGeom prst="bentConnector3">
+            <a:avLst>
+              <a:gd name="adj1" fmla="val 50000"/>
+            </a:avLst>
+          </a:prstGeom>
+          <a:ln w="19050" cap="rnd" cmpd="sng">
+            <a:solidFill>
+              <a:schemeClr val="tx1">
+                <a:lumMod val="50000"/>
+                <a:lumOff val="50000"/>
+              </a:schemeClr>
+            </a:solidFill>
+            <a:miter lim="800000"/>
+            <a:headEnd type="none" w="med" len="med"/>
+            <a:tailEnd type="none" w="med" len="med"/>
+          </a:ln>
+        </p:spPr>
+        <p:style>
+          <a:lnRef idx="1">
+            <a:schemeClr val="accent1"/>
+          </a:lnRef>
+          <a:fillRef idx="0">
+            <a:schemeClr val="accent1"/>
+          </a:fillRef>
+          <a:effectRef idx="0">
+            <a:schemeClr val="accent1"/>
+          </a:effectRef>
+          <a:fontRef idx="minor">
+            <a:schemeClr val="tx1"/>
+          </a:fontRef>
+        </p:style>
+      </p:cxnSp>
+      <p:sp>
+        <p:nvSpPr>
+          <p:cNvPr id="109" name="Rectangle: Rounded Corners 108">
+            <a:extLst>
+              <a:ext uri="{FF2B5EF4-FFF2-40B4-BE49-F238E27FC236}">
+                <a16:creationId xmlns:a16="http://schemas.microsoft.com/office/drawing/2014/main" id="{7344F5C0-3C9A-4F4E-9710-78A4488455C6}"/>
+              </a:ext>
+            </a:extLst>
+          </p:cNvPr>
+          <p:cNvSpPr/>
+          <p:nvPr/>
+        </p:nvSpPr>
+        <p:spPr>
+          <a:xfrm>
+            <a:off x="412087" y="242934"/>
+            <a:ext cx="1300178" cy="1019532"/>
+          </a:xfrm>
+          <a:prstGeom prst="roundRect">
+            <a:avLst/>
+          </a:prstGeom>
+          <a:solidFill>
+            <a:schemeClr val="accent4">
+              <a:lumMod val="60000"/>
+              <a:lumOff val="40000"/>
+            </a:schemeClr>
+          </a:solidFill>
+          <a:ln>
+            <a:solidFill>
+              <a:schemeClr val="bg1">
+                <a:lumMod val="50000"/>
+              </a:schemeClr>
+            </a:solidFill>
+          </a:ln>
+        </p:spPr>
+        <p:style>
+          <a:lnRef idx="3">
+            <a:schemeClr val="lt1"/>
+          </a:lnRef>
+          <a:fillRef idx="1">
+            <a:schemeClr val="accent3"/>
+          </a:fillRef>
+          <a:effectRef idx="1">
+            <a:schemeClr val="accent3"/>
+          </a:effectRef>
+          <a:fontRef idx="minor">
+            <a:schemeClr val="lt1"/>
+          </a:fontRef>
+        </p:style>
+        <p:txBody>
+          <a:bodyPr rtlCol="0" anchor="ctr"/>
+          <a:lstStyle/>
+          <a:p>
+            <a:pPr marL="171450" indent="-171450">
+              <a:buFont typeface="Arial" panose="020B0604020202020204" pitchFamily="34" charset="0"/>
+              <a:buChar char="•"/>
+            </a:pPr>
+            <a:r>
+              <a:rPr lang="de-DE" sz="1000" dirty="0">
+                <a:solidFill>
+                  <a:schemeClr val="tx1">
+                    <a:lumMod val="65000"/>
+                    <a:lumOff val="35000"/>
+                  </a:schemeClr>
+                </a:solidFill>
+              </a:rPr>
+              <a:t>Lampen</a:t>
+            </a:r>
+          </a:p>
+          <a:p>
+            <a:pPr marL="171450" indent="-171450">
+              <a:buFont typeface="Arial" panose="020B0604020202020204" pitchFamily="34" charset="0"/>
+              <a:buChar char="•"/>
+            </a:pPr>
+            <a:r>
+              <a:rPr lang="de-DE" sz="1000" dirty="0">
+                <a:solidFill>
+                  <a:schemeClr val="tx1">
+                    <a:lumMod val="65000"/>
+                    <a:lumOff val="35000"/>
+                  </a:schemeClr>
+                </a:solidFill>
+              </a:rPr>
+              <a:t>Steckdosen</a:t>
+            </a:r>
+          </a:p>
+          <a:p>
+            <a:pPr marL="171450" indent="-171450">
+              <a:buFont typeface="Arial" panose="020B0604020202020204" pitchFamily="34" charset="0"/>
+              <a:buChar char="•"/>
+            </a:pPr>
+            <a:r>
+              <a:rPr lang="de-DE" sz="1000" dirty="0">
+                <a:solidFill>
+                  <a:schemeClr val="tx1">
+                    <a:lumMod val="65000"/>
+                    <a:lumOff val="35000"/>
+                  </a:schemeClr>
+                </a:solidFill>
+              </a:rPr>
+              <a:t>Heizung</a:t>
+            </a:r>
+          </a:p>
+          <a:p>
+            <a:pPr marL="171450" indent="-171450">
+              <a:buFont typeface="Arial" panose="020B0604020202020204" pitchFamily="34" charset="0"/>
+              <a:buChar char="•"/>
+            </a:pPr>
+            <a:r>
+              <a:rPr lang="de-DE" sz="1000" dirty="0">
+                <a:solidFill>
+                  <a:schemeClr val="tx1">
+                    <a:lumMod val="65000"/>
+                    <a:lumOff val="35000"/>
+                  </a:schemeClr>
+                </a:solidFill>
+              </a:rPr>
+              <a:t>Rollladen</a:t>
+            </a:r>
+          </a:p>
+          <a:p>
+            <a:pPr marL="171450" indent="-171450">
+              <a:buFont typeface="Arial" panose="020B0604020202020204" pitchFamily="34" charset="0"/>
+              <a:buChar char="•"/>
+            </a:pPr>
+            <a:r>
+              <a:rPr lang="de-DE" sz="1000" dirty="0">
+                <a:solidFill>
+                  <a:schemeClr val="tx1">
+                    <a:lumMod val="65000"/>
+                    <a:lumOff val="35000"/>
+                  </a:schemeClr>
+                </a:solidFill>
+              </a:rPr>
+              <a:t>Herd</a:t>
+            </a:r>
+          </a:p>
+          <a:p>
+            <a:pPr marL="171450" indent="-171450">
+              <a:buFont typeface="Arial" panose="020B0604020202020204" pitchFamily="34" charset="0"/>
+              <a:buChar char="•"/>
+            </a:pPr>
+            <a:r>
+              <a:rPr lang="de-DE" sz="1000" dirty="0">
+                <a:solidFill>
+                  <a:schemeClr val="tx1">
+                    <a:lumMod val="65000"/>
+                    <a:lumOff val="35000"/>
+                  </a:schemeClr>
+                </a:solidFill>
+              </a:rPr>
+              <a:t>Bügeleisen</a:t>
+            </a:r>
+          </a:p>
+        </p:txBody>
+      </p:sp>
+      <p:sp>
+        <p:nvSpPr>
+          <p:cNvPr id="112" name="Rectangle: Rounded Corners 111">
+            <a:extLst>
+              <a:ext uri="{FF2B5EF4-FFF2-40B4-BE49-F238E27FC236}">
+                <a16:creationId xmlns:a16="http://schemas.microsoft.com/office/drawing/2014/main" id="{B55A623E-807E-4935-BCDF-7E4443E9ADF2}"/>
+              </a:ext>
+            </a:extLst>
+          </p:cNvPr>
+          <p:cNvSpPr/>
+          <p:nvPr/>
+        </p:nvSpPr>
+        <p:spPr>
+          <a:xfrm>
+            <a:off x="413183" y="1640020"/>
+            <a:ext cx="1300178" cy="682666"/>
+          </a:xfrm>
+          <a:prstGeom prst="roundRect">
+            <a:avLst/>
+          </a:prstGeom>
+          <a:solidFill>
+            <a:schemeClr val="accent4">
+              <a:lumMod val="60000"/>
+              <a:lumOff val="40000"/>
+            </a:schemeClr>
+          </a:solidFill>
+          <a:ln>
+            <a:solidFill>
+              <a:schemeClr val="bg1">
+                <a:lumMod val="50000"/>
+              </a:schemeClr>
+            </a:solidFill>
+          </a:ln>
+        </p:spPr>
+        <p:style>
+          <a:lnRef idx="3">
+            <a:schemeClr val="lt1"/>
+          </a:lnRef>
+          <a:fillRef idx="1">
+            <a:schemeClr val="accent3"/>
+          </a:fillRef>
+          <a:effectRef idx="1">
+            <a:schemeClr val="accent3"/>
+          </a:effectRef>
+          <a:fontRef idx="minor">
+            <a:schemeClr val="lt1"/>
+          </a:fontRef>
+        </p:style>
+        <p:txBody>
+          <a:bodyPr rtlCol="0" anchor="ctr"/>
+          <a:lstStyle/>
+          <a:p>
+            <a:pPr marL="171450" indent="-171450">
+              <a:buFont typeface="Arial" panose="020B0604020202020204" pitchFamily="34" charset="0"/>
+              <a:buChar char="•"/>
+            </a:pPr>
+            <a:r>
+              <a:rPr lang="de-DE" sz="1000" dirty="0">
+                <a:solidFill>
+                  <a:schemeClr val="tx1">
+                    <a:lumMod val="65000"/>
+                    <a:lumOff val="35000"/>
+                  </a:schemeClr>
+                </a:solidFill>
+              </a:rPr>
+              <a:t>Türschloss</a:t>
+            </a:r>
+          </a:p>
+          <a:p>
+            <a:pPr marL="171450" indent="-171450">
+              <a:buFont typeface="Arial" panose="020B0604020202020204" pitchFamily="34" charset="0"/>
+              <a:buChar char="•"/>
+            </a:pPr>
+            <a:r>
+              <a:rPr lang="de-DE" sz="1000" dirty="0">
+                <a:solidFill>
+                  <a:schemeClr val="tx1">
+                    <a:lumMod val="65000"/>
+                    <a:lumOff val="35000"/>
+                  </a:schemeClr>
+                </a:solidFill>
+              </a:rPr>
+              <a:t>Dachfenster</a:t>
+            </a:r>
+          </a:p>
+          <a:p>
+            <a:pPr marL="171450" indent="-171450">
+              <a:buFont typeface="Arial" panose="020B0604020202020204" pitchFamily="34" charset="0"/>
+              <a:buChar char="•"/>
+            </a:pPr>
+            <a:r>
+              <a:rPr lang="de-DE" sz="1000" dirty="0">
+                <a:solidFill>
+                  <a:schemeClr val="tx1">
+                    <a:lumMod val="65000"/>
+                    <a:lumOff val="35000"/>
+                  </a:schemeClr>
+                </a:solidFill>
+              </a:rPr>
+              <a:t>Heizung Leon</a:t>
+            </a:r>
+          </a:p>
+        </p:txBody>
+      </p:sp>
+      <p:sp>
+        <p:nvSpPr>
+          <p:cNvPr id="114" name="Rectangle: Rounded Corners 113">
+            <a:extLst>
+              <a:ext uri="{FF2B5EF4-FFF2-40B4-BE49-F238E27FC236}">
+                <a16:creationId xmlns:a16="http://schemas.microsoft.com/office/drawing/2014/main" id="{0537CE80-D199-46FD-8ADA-072822F75FF8}"/>
+              </a:ext>
+            </a:extLst>
+          </p:cNvPr>
+          <p:cNvSpPr/>
+          <p:nvPr/>
+        </p:nvSpPr>
+        <p:spPr>
+          <a:xfrm>
+            <a:off x="5772413" y="2856811"/>
+            <a:ext cx="1161788" cy="1203583"/>
+          </a:xfrm>
+          <a:prstGeom prst="roundRect">
+            <a:avLst/>
+          </a:prstGeom>
+          <a:solidFill>
+            <a:schemeClr val="accent4">
+              <a:lumMod val="60000"/>
+              <a:lumOff val="40000"/>
+            </a:schemeClr>
+          </a:solidFill>
+          <a:ln>
+            <a:solidFill>
+              <a:schemeClr val="bg1">
+                <a:lumMod val="50000"/>
+              </a:schemeClr>
+            </a:solidFill>
+          </a:ln>
+        </p:spPr>
+        <p:style>
+          <a:lnRef idx="3">
+            <a:schemeClr val="lt1"/>
+          </a:lnRef>
+          <a:fillRef idx="1">
+            <a:schemeClr val="accent3"/>
+          </a:fillRef>
+          <a:effectRef idx="1">
+            <a:schemeClr val="accent3"/>
+          </a:effectRef>
+          <a:fontRef idx="minor">
+            <a:schemeClr val="lt1"/>
+          </a:fontRef>
+        </p:style>
+        <p:txBody>
+          <a:bodyPr rtlCol="0" anchor="ctr"/>
+          <a:lstStyle/>
+          <a:p>
+            <a:r>
+              <a:rPr lang="de-DE" sz="1000" b="1" dirty="0">
+                <a:solidFill>
+                  <a:schemeClr val="tx1">
+                    <a:lumMod val="65000"/>
+                    <a:lumOff val="35000"/>
+                  </a:schemeClr>
+                </a:solidFill>
+              </a:rPr>
+              <a:t>ESP</a:t>
+            </a:r>
+          </a:p>
+          <a:p>
+            <a:pPr marL="171450" indent="-171450">
+              <a:buFont typeface="Arial" panose="020B0604020202020204" pitchFamily="34" charset="0"/>
+              <a:buChar char="•"/>
+            </a:pPr>
+            <a:r>
+              <a:rPr lang="de-DE" sz="1000" dirty="0">
+                <a:solidFill>
+                  <a:schemeClr val="tx1">
+                    <a:lumMod val="65000"/>
+                    <a:lumOff val="35000"/>
+                  </a:schemeClr>
+                </a:solidFill>
+              </a:rPr>
+              <a:t>Kellertür</a:t>
+            </a:r>
+          </a:p>
+          <a:p>
+            <a:pPr marL="171450" indent="-171450">
+              <a:buFont typeface="Arial" panose="020B0604020202020204" pitchFamily="34" charset="0"/>
+              <a:buChar char="•"/>
+            </a:pPr>
+            <a:r>
+              <a:rPr lang="de-DE" sz="1000" dirty="0">
+                <a:solidFill>
+                  <a:schemeClr val="tx1">
+                    <a:lumMod val="65000"/>
+                    <a:lumOff val="35000"/>
+                  </a:schemeClr>
+                </a:solidFill>
+              </a:rPr>
+              <a:t>Zisterne</a:t>
+            </a:r>
+          </a:p>
+          <a:p>
+            <a:pPr marL="171450" indent="-171450">
+              <a:buFont typeface="Arial" panose="020B0604020202020204" pitchFamily="34" charset="0"/>
+              <a:buChar char="•"/>
+            </a:pPr>
+            <a:r>
+              <a:rPr lang="de-DE" sz="1000" dirty="0">
+                <a:solidFill>
+                  <a:schemeClr val="tx1">
+                    <a:lumMod val="65000"/>
+                    <a:lumOff val="35000"/>
+                  </a:schemeClr>
+                </a:solidFill>
+              </a:rPr>
+              <a:t>Pool</a:t>
+            </a:r>
+          </a:p>
+          <a:p>
+            <a:pPr marL="171450" indent="-171450">
+              <a:buFont typeface="Arial" panose="020B0604020202020204" pitchFamily="34" charset="0"/>
+              <a:buChar char="•"/>
+            </a:pPr>
+            <a:r>
+              <a:rPr lang="de-DE" sz="1000" dirty="0">
+                <a:solidFill>
+                  <a:schemeClr val="tx1">
+                    <a:lumMod val="65000"/>
+                    <a:lumOff val="35000"/>
+                  </a:schemeClr>
+                </a:solidFill>
+              </a:rPr>
+              <a:t>Sauna</a:t>
+            </a:r>
+          </a:p>
+          <a:p>
+            <a:pPr marL="171450" indent="-171450">
+              <a:buFont typeface="Arial" panose="020B0604020202020204" pitchFamily="34" charset="0"/>
+              <a:buChar char="•"/>
+            </a:pPr>
+            <a:r>
+              <a:rPr lang="de-DE" sz="1000" dirty="0">
+                <a:solidFill>
+                  <a:schemeClr val="tx1">
+                    <a:lumMod val="65000"/>
+                    <a:lumOff val="35000"/>
+                  </a:schemeClr>
+                </a:solidFill>
+              </a:rPr>
+              <a:t>Weihnachten</a:t>
+            </a:r>
+          </a:p>
+        </p:txBody>
+      </p:sp>
+      <p:cxnSp>
+        <p:nvCxnSpPr>
+          <p:cNvPr id="118" name="Connector: Elbow 117">
+            <a:extLst>
+              <a:ext uri="{FF2B5EF4-FFF2-40B4-BE49-F238E27FC236}">
+                <a16:creationId xmlns:a16="http://schemas.microsoft.com/office/drawing/2014/main" id="{99F4E0DC-DFBB-4099-97CB-1DDC678E8166}"/>
+              </a:ext>
+            </a:extLst>
+          </p:cNvPr>
+          <p:cNvCxnSpPr>
+            <a:cxnSpLocks/>
+            <a:stCxn id="100" idx="1"/>
+            <a:endCxn id="109" idx="3"/>
+          </p:cNvCxnSpPr>
+          <p:nvPr/>
+        </p:nvCxnSpPr>
+        <p:spPr>
+          <a:xfrm rot="10800000">
+            <a:off x="1712266" y="752700"/>
+            <a:ext cx="489453" cy="228254"/>
+          </a:xfrm>
+          <a:prstGeom prst="bentConnector3">
+            <a:avLst/>
+          </a:prstGeom>
+          <a:ln w="19050" cap="rnd" cmpd="sng">
+            <a:solidFill>
+              <a:schemeClr val="tx1">
+                <a:lumMod val="50000"/>
+                <a:lumOff val="50000"/>
+              </a:schemeClr>
+            </a:solidFill>
+            <a:miter lim="800000"/>
+            <a:headEnd type="none" w="med" len="med"/>
+            <a:tailEnd type="none" w="med" len="med"/>
+          </a:ln>
+        </p:spPr>
+        <p:style>
+          <a:lnRef idx="1">
+            <a:schemeClr val="accent1"/>
+          </a:lnRef>
+          <a:fillRef idx="0">
+            <a:schemeClr val="accent1"/>
+          </a:fillRef>
+          <a:effectRef idx="0">
+            <a:schemeClr val="accent1"/>
+          </a:effectRef>
+          <a:fontRef idx="minor">
+            <a:schemeClr val="tx1"/>
+          </a:fontRef>
+        </p:style>
+      </p:cxnSp>
+      <p:cxnSp>
+        <p:nvCxnSpPr>
+          <p:cNvPr id="119" name="Connector: Elbow 118">
+            <a:extLst>
+              <a:ext uri="{FF2B5EF4-FFF2-40B4-BE49-F238E27FC236}">
+                <a16:creationId xmlns:a16="http://schemas.microsoft.com/office/drawing/2014/main" id="{937A3D72-FF30-450D-9C6A-4795E322B439}"/>
+              </a:ext>
+            </a:extLst>
+          </p:cNvPr>
+          <p:cNvCxnSpPr>
+            <a:cxnSpLocks/>
+            <a:stCxn id="96" idx="1"/>
+            <a:endCxn id="112" idx="3"/>
+          </p:cNvCxnSpPr>
+          <p:nvPr/>
+        </p:nvCxnSpPr>
+        <p:spPr>
+          <a:xfrm rot="10800000">
+            <a:off x="1713362" y="1981354"/>
+            <a:ext cx="488357" cy="261735"/>
+          </a:xfrm>
+          <a:prstGeom prst="bentConnector3">
+            <a:avLst/>
+          </a:prstGeom>
+          <a:ln w="19050" cap="rnd" cmpd="sng">
+            <a:solidFill>
+              <a:schemeClr val="tx1">
+                <a:lumMod val="50000"/>
+                <a:lumOff val="50000"/>
+              </a:schemeClr>
+            </a:solidFill>
+            <a:miter lim="800000"/>
+            <a:headEnd type="none" w="med" len="med"/>
+            <a:tailEnd type="none" w="med" len="med"/>
+          </a:ln>
+        </p:spPr>
+        <p:style>
+          <a:lnRef idx="1">
+            <a:schemeClr val="accent1"/>
+          </a:lnRef>
+          <a:fillRef idx="0">
+            <a:schemeClr val="accent1"/>
+          </a:fillRef>
+          <a:effectRef idx="0">
+            <a:schemeClr val="accent1"/>
+          </a:effectRef>
+          <a:fontRef idx="minor">
+            <a:schemeClr val="tx1"/>
+          </a:fontRef>
+        </p:style>
+      </p:cxnSp>
+      <p:cxnSp>
+        <p:nvCxnSpPr>
+          <p:cNvPr id="120" name="Connector: Elbow 119">
+            <a:extLst>
+              <a:ext uri="{FF2B5EF4-FFF2-40B4-BE49-F238E27FC236}">
+                <a16:creationId xmlns:a16="http://schemas.microsoft.com/office/drawing/2014/main" id="{F46C7672-B3B3-448A-8F6A-A3D21C519B8B}"/>
+              </a:ext>
+            </a:extLst>
+          </p:cNvPr>
+          <p:cNvCxnSpPr>
+            <a:cxnSpLocks/>
+            <a:stCxn id="121" idx="1"/>
+            <a:endCxn id="147" idx="3"/>
+          </p:cNvCxnSpPr>
+          <p:nvPr/>
+        </p:nvCxnSpPr>
+        <p:spPr>
+          <a:xfrm rot="10800000" flipV="1">
+            <a:off x="7042702" y="919128"/>
+            <a:ext cx="441825" cy="300551"/>
+          </a:xfrm>
+          <a:prstGeom prst="bentConnector3">
+            <a:avLst/>
+          </a:prstGeom>
+          <a:ln w="19050" cap="rnd" cmpd="sng">
+            <a:solidFill>
+              <a:schemeClr val="tx1">
+                <a:lumMod val="50000"/>
+                <a:lumOff val="50000"/>
+              </a:schemeClr>
+            </a:solidFill>
+            <a:miter lim="800000"/>
+            <a:headEnd type="none" w="med" len="med"/>
+            <a:tailEnd type="none" w="med" len="med"/>
+          </a:ln>
+        </p:spPr>
+        <p:style>
+          <a:lnRef idx="1">
+            <a:schemeClr val="accent1"/>
+          </a:lnRef>
+          <a:fillRef idx="0">
+            <a:schemeClr val="accent1"/>
+          </a:fillRef>
+          <a:effectRef idx="0">
+            <a:schemeClr val="accent1"/>
+          </a:effectRef>
+          <a:fontRef idx="minor">
+            <a:schemeClr val="tx1"/>
+          </a:fontRef>
+        </p:style>
+      </p:cxnSp>
+      <p:sp>
+        <p:nvSpPr>
+          <p:cNvPr id="121" name="Rectangle: Rounded Corners 120">
+            <a:extLst>
+              <a:ext uri="{FF2B5EF4-FFF2-40B4-BE49-F238E27FC236}">
+                <a16:creationId xmlns:a16="http://schemas.microsoft.com/office/drawing/2014/main" id="{D5F69A27-658F-4F3C-9CE7-095F7959799E}"/>
+              </a:ext>
+            </a:extLst>
+          </p:cNvPr>
+          <p:cNvSpPr/>
+          <p:nvPr/>
+        </p:nvSpPr>
+        <p:spPr>
+          <a:xfrm>
+            <a:off x="7484526" y="718577"/>
+            <a:ext cx="1300178" cy="401103"/>
+          </a:xfrm>
+          <a:prstGeom prst="roundRect">
+            <a:avLst/>
+          </a:prstGeom>
+          <a:solidFill>
+            <a:schemeClr val="accent4">
+              <a:lumMod val="60000"/>
+              <a:lumOff val="40000"/>
+            </a:schemeClr>
+          </a:solidFill>
+          <a:ln>
+            <a:solidFill>
+              <a:schemeClr val="bg1">
+                <a:lumMod val="50000"/>
+              </a:schemeClr>
+            </a:solidFill>
+          </a:ln>
+        </p:spPr>
+        <p:style>
+          <a:lnRef idx="3">
+            <a:schemeClr val="lt1"/>
+          </a:lnRef>
+          <a:fillRef idx="1">
+            <a:schemeClr val="accent3"/>
+          </a:fillRef>
+          <a:effectRef idx="1">
+            <a:schemeClr val="accent3"/>
+          </a:effectRef>
+          <a:fontRef idx="minor">
+            <a:schemeClr val="lt1"/>
+          </a:fontRef>
+        </p:style>
+        <p:txBody>
+          <a:bodyPr rtlCol="0" anchor="ctr"/>
+          <a:lstStyle/>
+          <a:p>
+            <a:pPr marL="171450" indent="-171450">
+              <a:buFont typeface="Arial" panose="020B0604020202020204" pitchFamily="34" charset="0"/>
+              <a:buChar char="•"/>
+            </a:pPr>
+            <a:r>
+              <a:rPr lang="de-DE" sz="1000" dirty="0">
+                <a:solidFill>
+                  <a:schemeClr val="tx1">
+                    <a:lumMod val="65000"/>
+                    <a:lumOff val="35000"/>
+                  </a:schemeClr>
+                </a:solidFill>
+              </a:rPr>
+              <a:t>Funksteckdosen</a:t>
+            </a:r>
+          </a:p>
+          <a:p>
+            <a:pPr marL="171450" indent="-171450">
+              <a:buFont typeface="Arial" panose="020B0604020202020204" pitchFamily="34" charset="0"/>
+              <a:buChar char="•"/>
+            </a:pPr>
+            <a:r>
+              <a:rPr lang="de-DE" sz="1000" dirty="0">
+                <a:solidFill>
+                  <a:schemeClr val="tx1">
+                    <a:lumMod val="65000"/>
+                    <a:lumOff val="35000"/>
+                  </a:schemeClr>
+                </a:solidFill>
+              </a:rPr>
+              <a:t>Temperatur</a:t>
+            </a:r>
+          </a:p>
+        </p:txBody>
+      </p:sp>
+      <p:sp>
+        <p:nvSpPr>
+          <p:cNvPr id="125" name="Rectangle: Rounded Corners 124">
+            <a:extLst>
+              <a:ext uri="{FF2B5EF4-FFF2-40B4-BE49-F238E27FC236}">
+                <a16:creationId xmlns:a16="http://schemas.microsoft.com/office/drawing/2014/main" id="{D6473B16-2141-42A2-889A-E4D7C27769B5}"/>
+              </a:ext>
+            </a:extLst>
+          </p:cNvPr>
+          <p:cNvSpPr/>
+          <p:nvPr/>
+        </p:nvSpPr>
+        <p:spPr>
+          <a:xfrm>
+            <a:off x="4099714" y="2691851"/>
+            <a:ext cx="1074882" cy="329922"/>
+          </a:xfrm>
+          <a:prstGeom prst="roundRect">
+            <a:avLst/>
+          </a:prstGeom>
+          <a:ln>
+            <a:solidFill>
+              <a:schemeClr val="bg1">
+                <a:lumMod val="50000"/>
+              </a:schemeClr>
+            </a:solidFill>
+          </a:ln>
+        </p:spPr>
+        <p:style>
+          <a:lnRef idx="3">
+            <a:schemeClr val="lt1"/>
+          </a:lnRef>
+          <a:fillRef idx="1">
+            <a:schemeClr val="accent3"/>
+          </a:fillRef>
+          <a:effectRef idx="1">
+            <a:schemeClr val="accent3"/>
+          </a:effectRef>
+          <a:fontRef idx="minor">
+            <a:schemeClr val="lt1"/>
+          </a:fontRef>
+        </p:style>
+        <p:txBody>
+          <a:bodyPr rtlCol="0" anchor="ctr"/>
+          <a:lstStyle/>
+          <a:p>
+            <a:pPr algn="ctr"/>
+            <a:r>
+              <a:rPr lang="de-DE" sz="1400" dirty="0"/>
+              <a:t>HTTP</a:t>
+            </a:r>
+          </a:p>
+        </p:txBody>
+      </p:sp>
+      <p:cxnSp>
+        <p:nvCxnSpPr>
+          <p:cNvPr id="127" name="Straight Arrow Connector 126">
+            <a:extLst>
+              <a:ext uri="{FF2B5EF4-FFF2-40B4-BE49-F238E27FC236}">
+                <a16:creationId xmlns:a16="http://schemas.microsoft.com/office/drawing/2014/main" id="{0B3362D4-7396-4451-A84C-55857473FE09}"/>
+              </a:ext>
+            </a:extLst>
+          </p:cNvPr>
+          <p:cNvCxnSpPr>
+            <a:cxnSpLocks/>
+            <a:stCxn id="125" idx="0"/>
+            <a:endCxn id="69" idx="2"/>
+          </p:cNvCxnSpPr>
+          <p:nvPr/>
+        </p:nvCxnSpPr>
+        <p:spPr>
+          <a:xfrm flipV="1">
+            <a:off x="4637155" y="2495102"/>
+            <a:ext cx="0" cy="196749"/>
           </a:xfrm>
           <a:prstGeom prst="straightConnector1">
             <a:avLst/>
@@ -4261,280 +5361,12 @@
           </a:fontRef>
         </p:style>
       </p:cxnSp>
-      <p:cxnSp>
-        <p:nvCxnSpPr>
-          <p:cNvPr id="92" name="Straight Arrow Connector 91">
+      <p:sp>
+        <p:nvSpPr>
+          <p:cNvPr id="128" name="Rectangle: Rounded Corners 127">
             <a:extLst>
               <a:ext uri="{FF2B5EF4-FFF2-40B4-BE49-F238E27FC236}">
-                <a16:creationId xmlns:a16="http://schemas.microsoft.com/office/drawing/2014/main" id="{C82ED433-19E4-425B-B25D-783AB6660D13}"/>
-              </a:ext>
-            </a:extLst>
-          </p:cNvPr>
-          <p:cNvCxnSpPr>
-            <a:cxnSpLocks/>
-            <a:stCxn id="78" idx="3"/>
-            <a:endCxn id="69" idx="1"/>
-          </p:cNvCxnSpPr>
-          <p:nvPr/>
-        </p:nvCxnSpPr>
-        <p:spPr>
-          <a:xfrm flipV="1">
-            <a:off x="2941451" y="1678895"/>
-            <a:ext cx="4760400" cy="1429"/>
-          </a:xfrm>
-          <a:prstGeom prst="straightConnector1">
-            <a:avLst/>
-          </a:prstGeom>
-          <a:ln w="19050" cap="rnd" cmpd="sng">
-            <a:solidFill>
-              <a:schemeClr val="tx1">
-                <a:lumMod val="50000"/>
-                <a:lumOff val="50000"/>
-              </a:schemeClr>
-            </a:solidFill>
-            <a:miter lim="800000"/>
-            <a:headEnd type="none" w="med" len="med"/>
-            <a:tailEnd type="none" w="med" len="med"/>
-          </a:ln>
-        </p:spPr>
-        <p:style>
-          <a:lnRef idx="1">
-            <a:schemeClr val="accent1"/>
-          </a:lnRef>
-          <a:fillRef idx="0">
-            <a:schemeClr val="accent1"/>
-          </a:fillRef>
-          <a:effectRef idx="0">
-            <a:schemeClr val="accent1"/>
-          </a:effectRef>
-          <a:fontRef idx="minor">
-            <a:schemeClr val="tx1"/>
-          </a:fontRef>
-        </p:style>
-      </p:cxnSp>
-      <p:grpSp>
-        <p:nvGrpSpPr>
-          <p:cNvPr id="90" name="Group 89">
-            <a:extLst>
-              <a:ext uri="{FF2B5EF4-FFF2-40B4-BE49-F238E27FC236}">
-                <a16:creationId xmlns:a16="http://schemas.microsoft.com/office/drawing/2014/main" id="{1F22D035-F1E4-4104-97E2-8FF3B90A38F5}"/>
-              </a:ext>
-            </a:extLst>
-          </p:cNvPr>
-          <p:cNvGrpSpPr/>
-          <p:nvPr/>
-        </p:nvGrpSpPr>
-        <p:grpSpPr>
-          <a:xfrm>
-            <a:off x="136483" y="292604"/>
-            <a:ext cx="1585662" cy="1177547"/>
-            <a:chOff x="1590675" y="242888"/>
-            <a:chExt cx="1585661" cy="1177547"/>
-          </a:xfrm>
-        </p:grpSpPr>
-        <p:pic>
-          <p:nvPicPr>
-            <p:cNvPr id="1036" name="Picture 12" descr="Bildergebnis fÃ¼r tablet">
-              <a:extLst>
-                <a:ext uri="{FF2B5EF4-FFF2-40B4-BE49-F238E27FC236}">
-                  <a16:creationId xmlns:a16="http://schemas.microsoft.com/office/drawing/2014/main" id="{43311141-616D-43B3-B6A1-EB7414DD543F}"/>
-                </a:ext>
-              </a:extLst>
-            </p:cNvPr>
-            <p:cNvPicPr>
-              <a:picLocks noChangeAspect="1" noChangeArrowheads="1"/>
-            </p:cNvPicPr>
-            <p:nvPr/>
-          </p:nvPicPr>
-          <p:blipFill>
-            <a:blip r:embed="rId6">
-              <a:extLst>
-                <a:ext uri="{28A0092B-C50C-407E-A947-70E740481C1C}">
-                  <a14:useLocalDpi xmlns:a14="http://schemas.microsoft.com/office/drawing/2010/main" val="0"/>
-                </a:ext>
-              </a:extLst>
-            </a:blip>
-            <a:srcRect/>
-            <a:stretch>
-              <a:fillRect/>
-            </a:stretch>
-          </p:blipFill>
-          <p:spPr bwMode="auto">
-            <a:xfrm>
-              <a:off x="1590675" y="242888"/>
-              <a:ext cx="1585661" cy="1177547"/>
-            </a:xfrm>
-            <a:prstGeom prst="rect">
-              <a:avLst/>
-            </a:prstGeom>
-            <a:noFill/>
-            <a:extLst>
-              <a:ext uri="{909E8E84-426E-40DD-AFC4-6F175D3DCCD1}">
-                <a14:hiddenFill xmlns:a14="http://schemas.microsoft.com/office/drawing/2010/main">
-                  <a:solidFill>
-                    <a:srgbClr val="FFFFFF"/>
-                  </a:solidFill>
-                </a14:hiddenFill>
-              </a:ext>
-            </a:extLst>
-          </p:spPr>
-        </p:pic>
-        <p:pic>
-          <p:nvPicPr>
-            <p:cNvPr id="1038" name="Picture 14" descr="Bildergebnis fÃ¼r rocrail view">
-              <a:extLst>
-                <a:ext uri="{FF2B5EF4-FFF2-40B4-BE49-F238E27FC236}">
-                  <a16:creationId xmlns:a16="http://schemas.microsoft.com/office/drawing/2014/main" id="{B862343A-E97A-4A8E-90A5-B43A6EFBCE2C}"/>
-                </a:ext>
-              </a:extLst>
-            </p:cNvPr>
-            <p:cNvPicPr>
-              <a:picLocks noChangeAspect="1" noChangeArrowheads="1"/>
-            </p:cNvPicPr>
-            <p:nvPr/>
-          </p:nvPicPr>
-          <p:blipFill>
-            <a:blip r:embed="rId7">
-              <a:extLst>
-                <a:ext uri="{28A0092B-C50C-407E-A947-70E740481C1C}">
-                  <a14:useLocalDpi xmlns:a14="http://schemas.microsoft.com/office/drawing/2010/main" val="0"/>
-                </a:ext>
-              </a:extLst>
-            </a:blip>
-            <a:srcRect/>
-            <a:stretch>
-              <a:fillRect/>
-            </a:stretch>
-          </p:blipFill>
-          <p:spPr bwMode="auto">
-            <a:xfrm>
-              <a:off x="1746682" y="385781"/>
-              <a:ext cx="1310747" cy="872583"/>
-            </a:xfrm>
-            <a:prstGeom prst="rect">
-              <a:avLst/>
-            </a:prstGeom>
-            <a:noFill/>
-            <a:extLst>
-              <a:ext uri="{909E8E84-426E-40DD-AFC4-6F175D3DCCD1}">
-                <a14:hiddenFill xmlns:a14="http://schemas.microsoft.com/office/drawing/2010/main">
-                  <a:solidFill>
-                    <a:srgbClr val="FFFFFF"/>
-                  </a:solidFill>
-                </a14:hiddenFill>
-              </a:ext>
-            </a:extLst>
-          </p:spPr>
-        </p:pic>
-        <p:sp>
-          <p:nvSpPr>
-            <p:cNvPr id="89" name="TextBox 88">
-              <a:extLst>
-                <a:ext uri="{FF2B5EF4-FFF2-40B4-BE49-F238E27FC236}">
-                  <a16:creationId xmlns:a16="http://schemas.microsoft.com/office/drawing/2014/main" id="{4D19BEE6-7233-41B2-B258-9BDF2F034B3F}"/>
-                </a:ext>
-              </a:extLst>
-            </p:cNvPr>
-            <p:cNvSpPr txBox="1"/>
-            <p:nvPr/>
-          </p:nvSpPr>
-          <p:spPr>
-            <a:xfrm>
-              <a:off x="2165838" y="771237"/>
-              <a:ext cx="891590" cy="261610"/>
-            </a:xfrm>
-            <a:prstGeom prst="rect">
-              <a:avLst/>
-            </a:prstGeom>
-            <a:noFill/>
-          </p:spPr>
-          <p:txBody>
-            <a:bodyPr wrap="none" rtlCol="0">
-              <a:spAutoFit/>
-            </a:bodyPr>
-            <a:lstStyle/>
-            <a:p>
-              <a:r>
-                <a:rPr lang="de-DE" sz="1100" dirty="0" err="1">
-                  <a:solidFill>
-                    <a:schemeClr val="tx1">
-                      <a:lumMod val="50000"/>
-                      <a:lumOff val="50000"/>
-                    </a:schemeClr>
-                  </a:solidFill>
-                </a:rPr>
-                <a:t>Rocrail</a:t>
-              </a:r>
-              <a:r>
-                <a:rPr lang="de-DE" sz="1100" dirty="0">
-                  <a:solidFill>
-                    <a:schemeClr val="tx1">
-                      <a:lumMod val="50000"/>
-                      <a:lumOff val="50000"/>
-                    </a:schemeClr>
-                  </a:solidFill>
-                </a:rPr>
-                <a:t> View</a:t>
-              </a:r>
-            </a:p>
-          </p:txBody>
-        </p:sp>
-      </p:grpSp>
-      <p:cxnSp>
-        <p:nvCxnSpPr>
-          <p:cNvPr id="93" name="Straight Connector 92">
-            <a:extLst>
-              <a:ext uri="{FF2B5EF4-FFF2-40B4-BE49-F238E27FC236}">
-                <a16:creationId xmlns:a16="http://schemas.microsoft.com/office/drawing/2014/main" id="{55AD7A43-5393-48ED-853F-13CE6E1C9C8D}"/>
-              </a:ext>
-            </a:extLst>
-          </p:cNvPr>
-          <p:cNvCxnSpPr>
-            <a:cxnSpLocks/>
-            <a:stCxn id="1036" idx="2"/>
-            <a:endCxn id="1026" idx="1"/>
-          </p:cNvCxnSpPr>
-          <p:nvPr/>
-        </p:nvCxnSpPr>
-        <p:spPr>
-          <a:xfrm>
-            <a:off x="929314" y="1470151"/>
-            <a:ext cx="1271521" cy="208745"/>
-          </a:xfrm>
-          <a:prstGeom prst="line">
-            <a:avLst/>
-          </a:prstGeom>
-          <a:ln w="38100">
-            <a:solidFill>
-              <a:schemeClr val="tx1">
-                <a:lumMod val="50000"/>
-                <a:lumOff val="50000"/>
-              </a:schemeClr>
-            </a:solidFill>
-            <a:prstDash val="sysDash"/>
-          </a:ln>
-        </p:spPr>
-        <p:style>
-          <a:lnRef idx="1">
-            <a:schemeClr val="accent1"/>
-          </a:lnRef>
-          <a:fillRef idx="0">
-            <a:schemeClr val="accent1"/>
-          </a:fillRef>
-          <a:effectRef idx="0">
-            <a:schemeClr val="accent1"/>
-          </a:effectRef>
-          <a:fontRef idx="minor">
-            <a:schemeClr val="tx1"/>
-          </a:fontRef>
-        </p:style>
-      </p:cxnSp>
-      <p:sp>
-        <p:nvSpPr>
-          <p:cNvPr id="103" name="Rectangle: Rounded Corners 102">
-            <a:extLst>
-              <a:ext uri="{FF2B5EF4-FFF2-40B4-BE49-F238E27FC236}">
-                <a16:creationId xmlns:a16="http://schemas.microsoft.com/office/drawing/2014/main" id="{22D8A4AD-3BF4-4E25-A56F-8826FCD94348}"/>
+                <a16:creationId xmlns:a16="http://schemas.microsoft.com/office/drawing/2014/main" id="{49A3FE12-87CC-4DFE-9747-A507498D65E1}"/>
               </a:ext>
             </a:extLst>
           </p:cNvPr>
@@ -4543,12 +5375,18 @@
         </p:nvSpPr>
         <p:spPr>
           <a:xfrm>
-            <a:off x="7701851" y="2217262"/>
-            <a:ext cx="967496" cy="361951"/>
+            <a:off x="7484526" y="1466989"/>
+            <a:ext cx="1300178" cy="401103"/>
           </a:xfrm>
           <a:prstGeom prst="roundRect">
             <a:avLst/>
           </a:prstGeom>
+          <a:solidFill>
+            <a:schemeClr val="accent4">
+              <a:lumMod val="60000"/>
+              <a:lumOff val="40000"/>
+            </a:schemeClr>
+          </a:solidFill>
           <a:ln>
             <a:solidFill>
               <a:schemeClr val="bg1">
@@ -4575,117 +5413,30 @@
           <a:bodyPr rtlCol="0" anchor="ctr"/>
           <a:lstStyle/>
           <a:p>
-            <a:pPr algn="ctr"/>
-            <a:r>
-              <a:rPr lang="de-DE" sz="1400" dirty="0"/>
-              <a:t>GCA-Pi01</a:t>
-            </a:r>
-            <a:endParaRPr lang="de-DE" sz="1400" b="1" dirty="0"/>
-          </a:p>
-        </p:txBody>
-      </p:sp>
-      <p:cxnSp>
-        <p:nvCxnSpPr>
-          <p:cNvPr id="105" name="Straight Arrow Connector 104">
+            <a:pPr marL="171450" indent="-171450">
+              <a:buFont typeface="Arial" panose="020B0604020202020204" pitchFamily="34" charset="0"/>
+              <a:buChar char="•"/>
+            </a:pPr>
+            <a:r>
+              <a:rPr lang="de-DE" sz="1000" dirty="0">
+                <a:solidFill>
+                  <a:schemeClr val="tx1">
+                    <a:lumMod val="65000"/>
+                    <a:lumOff val="35000"/>
+                  </a:schemeClr>
+                </a:solidFill>
+              </a:rPr>
+              <a:t>Heizung Vincent &amp; Bad</a:t>
+            </a:r>
+          </a:p>
+        </p:txBody>
+      </p:sp>
+      <p:sp>
+        <p:nvSpPr>
+          <p:cNvPr id="130" name="Rectangle: Rounded Corners 129">
             <a:extLst>
               <a:ext uri="{FF2B5EF4-FFF2-40B4-BE49-F238E27FC236}">
-                <a16:creationId xmlns:a16="http://schemas.microsoft.com/office/drawing/2014/main" id="{2DDE5DE3-4607-4FE8-BE27-D79C6CBA70CA}"/>
-              </a:ext>
-            </a:extLst>
-          </p:cNvPr>
-          <p:cNvCxnSpPr>
-            <a:cxnSpLocks/>
-            <a:stCxn id="103" idx="2"/>
-            <a:endCxn id="60" idx="0"/>
-          </p:cNvCxnSpPr>
-          <p:nvPr/>
-        </p:nvCxnSpPr>
-        <p:spPr>
-          <a:xfrm flipH="1">
-            <a:off x="8185601" y="2579211"/>
-            <a:ext cx="1" cy="1279116"/>
-          </a:xfrm>
-          <a:prstGeom prst="straightConnector1">
-            <a:avLst/>
-          </a:prstGeom>
-          <a:ln w="19050" cap="rnd" cmpd="sng">
-            <a:solidFill>
-              <a:schemeClr val="tx1">
-                <a:lumMod val="50000"/>
-                <a:lumOff val="50000"/>
-              </a:schemeClr>
-            </a:solidFill>
-            <a:miter lim="800000"/>
-            <a:headEnd type="none" w="med" len="med"/>
-            <a:tailEnd type="none" w="med" len="med"/>
-          </a:ln>
-        </p:spPr>
-        <p:style>
-          <a:lnRef idx="1">
-            <a:schemeClr val="accent1"/>
-          </a:lnRef>
-          <a:fillRef idx="0">
-            <a:schemeClr val="accent1"/>
-          </a:fillRef>
-          <a:effectRef idx="0">
-            <a:schemeClr val="accent1"/>
-          </a:effectRef>
-          <a:fontRef idx="minor">
-            <a:schemeClr val="tx1"/>
-          </a:fontRef>
-        </p:style>
-      </p:cxnSp>
-      <p:pic>
-        <p:nvPicPr>
-          <p:cNvPr id="1040" name="Picture 16" descr="https://www.modelleisenbahn-cms.de/images/product_images/popup_images/83331.jpg">
-            <a:extLst>
-              <a:ext uri="{FF2B5EF4-FFF2-40B4-BE49-F238E27FC236}">
-                <a16:creationId xmlns:a16="http://schemas.microsoft.com/office/drawing/2014/main" id="{7808FF14-6642-43E6-8189-72B60BB7E2F8}"/>
-              </a:ext>
-            </a:extLst>
-          </p:cNvPr>
-          <p:cNvPicPr>
-            <a:picLocks noChangeAspect="1" noChangeArrowheads="1"/>
-          </p:cNvPicPr>
-          <p:nvPr/>
-        </p:nvPicPr>
-        <p:blipFill rotWithShape="1">
-          <a:blip r:embed="rId8">
-            <a:extLst>
-              <a:ext uri="{28A0092B-C50C-407E-A947-70E740481C1C}">
-                <a14:useLocalDpi xmlns:a14="http://schemas.microsoft.com/office/drawing/2010/main" val="0"/>
-              </a:ext>
-            </a:extLst>
-          </a:blip>
-          <a:srcRect t="31941" b="36243"/>
-          <a:stretch/>
-        </p:blipFill>
-        <p:spPr bwMode="auto">
-          <a:xfrm>
-            <a:off x="1965197" y="5034986"/>
-            <a:ext cx="1127875" cy="269127"/>
-          </a:xfrm>
-          <a:prstGeom prst="rect">
-            <a:avLst/>
-          </a:prstGeom>
-          <a:noFill/>
-          <a:extLst>
-            <a:ext uri="{909E8E84-426E-40DD-AFC4-6F175D3DCCD1}">
-              <a14:hiddenFill xmlns:a14="http://schemas.microsoft.com/office/drawing/2010/main">
-                <a:solidFill>
-                  <a:srgbClr val="FFFFFF"/>
-                </a:solidFill>
-              </a14:hiddenFill>
-            </a:ext>
-          </a:extLst>
-        </p:spPr>
-      </p:pic>
-      <p:sp>
-        <p:nvSpPr>
-          <p:cNvPr id="113" name="Rectangle: Rounded Corners 112">
-            <a:extLst>
-              <a:ext uri="{FF2B5EF4-FFF2-40B4-BE49-F238E27FC236}">
-                <a16:creationId xmlns:a16="http://schemas.microsoft.com/office/drawing/2014/main" id="{1EFF1075-63F8-418A-9E9E-A32755D1FF1A}"/>
+                <a16:creationId xmlns:a16="http://schemas.microsoft.com/office/drawing/2014/main" id="{9DD3BAED-CF9F-4267-9192-E1051EF5669F}"/>
               </a:ext>
             </a:extLst>
           </p:cNvPr>
@@ -4694,13 +5445,18 @@
         </p:nvSpPr>
         <p:spPr>
           <a:xfrm>
-            <a:off x="1736635" y="4995609"/>
-            <a:ext cx="1665111" cy="352659"/>
+            <a:off x="7484526" y="2220304"/>
+            <a:ext cx="1300178" cy="401103"/>
           </a:xfrm>
           <a:prstGeom prst="roundRect">
             <a:avLst/>
           </a:prstGeom>
-          <a:noFill/>
+          <a:solidFill>
+            <a:schemeClr val="accent4">
+              <a:lumMod val="60000"/>
+              <a:lumOff val="40000"/>
+            </a:schemeClr>
+          </a:solidFill>
           <a:ln>
             <a:solidFill>
               <a:schemeClr val="bg1">
@@ -4727,484 +5483,52 @@
           <a:bodyPr rtlCol="0" anchor="ctr"/>
           <a:lstStyle/>
           <a:p>
-            <a:pPr algn="ctr"/>
-            <a:endParaRPr lang="de-DE" sz="1400" b="1" dirty="0"/>
-          </a:p>
-        </p:txBody>
-      </p:sp>
-      <p:sp>
-        <p:nvSpPr>
-          <p:cNvPr id="115" name="Rectangle: Rounded Corners 114">
-            <a:extLst>
-              <a:ext uri="{FF2B5EF4-FFF2-40B4-BE49-F238E27FC236}">
-                <a16:creationId xmlns:a16="http://schemas.microsoft.com/office/drawing/2014/main" id="{CA750C48-86DB-4592-825F-9BD1C78F6F3F}"/>
-              </a:ext>
-            </a:extLst>
-          </p:cNvPr>
-          <p:cNvSpPr/>
-          <p:nvPr/>
-        </p:nvSpPr>
-        <p:spPr>
-          <a:xfrm>
-            <a:off x="7347691" y="5576482"/>
-            <a:ext cx="1665111" cy="819351"/>
-          </a:xfrm>
-          <a:prstGeom prst="roundRect">
-            <a:avLst/>
-          </a:prstGeom>
-          <a:noFill/>
-          <a:ln>
-            <a:solidFill>
-              <a:schemeClr val="bg1">
-                <a:lumMod val="50000"/>
-              </a:schemeClr>
-            </a:solidFill>
-          </a:ln>
-        </p:spPr>
-        <p:style>
-          <a:lnRef idx="3">
-            <a:schemeClr val="lt1"/>
-          </a:lnRef>
-          <a:fillRef idx="1">
-            <a:schemeClr val="accent3"/>
-          </a:fillRef>
-          <a:effectRef idx="1">
-            <a:schemeClr val="accent3"/>
-          </a:effectRef>
-          <a:fontRef idx="minor">
-            <a:schemeClr val="lt1"/>
-          </a:fontRef>
-        </p:style>
-        <p:txBody>
-          <a:bodyPr rtlCol="0" anchor="t"/>
-          <a:lstStyle/>
-          <a:p>
-            <a:pPr algn="ctr"/>
-            <a:r>
-              <a:rPr lang="de-DE" sz="1200" b="1" dirty="0">
+            <a:pPr marL="171450" indent="-171450">
+              <a:buFont typeface="Arial" panose="020B0604020202020204" pitchFamily="34" charset="0"/>
+              <a:buChar char="•"/>
+            </a:pPr>
+            <a:r>
+              <a:rPr lang="de-DE" sz="1000" dirty="0" err="1">
                 <a:solidFill>
                   <a:schemeClr val="tx1">
-                    <a:lumMod val="50000"/>
-                    <a:lumOff val="50000"/>
+                    <a:lumMod val="65000"/>
+                    <a:lumOff val="35000"/>
                   </a:schemeClr>
                 </a:solidFill>
               </a:rPr>
-              <a:t>Gleisbesetztmeldung</a:t>
-            </a:r>
-          </a:p>
-          <a:p>
-            <a:pPr algn="ctr"/>
-            <a:r>
-              <a:rPr lang="de-DE" sz="1200" b="1" dirty="0">
-                <a:solidFill>
-                  <a:schemeClr val="tx1">
-                    <a:lumMod val="50000"/>
-                    <a:lumOff val="50000"/>
-                  </a:schemeClr>
-                </a:solidFill>
-              </a:rPr>
-              <a:t>Hallsensor</a:t>
-            </a:r>
+              <a:t>MagicCube</a:t>
+            </a:r>
+            <a:endParaRPr lang="de-DE" sz="1000" dirty="0">
+              <a:solidFill>
+                <a:schemeClr val="tx1">
+                  <a:lumMod val="65000"/>
+                  <a:lumOff val="35000"/>
+                </a:schemeClr>
+              </a:solidFill>
+            </a:endParaRPr>
           </a:p>
         </p:txBody>
       </p:sp>
       <p:cxnSp>
         <p:nvCxnSpPr>
-          <p:cNvPr id="116" name="Straight Arrow Connector 115">
+          <p:cNvPr id="132" name="Connector: Elbow 131">
             <a:extLst>
               <a:ext uri="{FF2B5EF4-FFF2-40B4-BE49-F238E27FC236}">
-                <a16:creationId xmlns:a16="http://schemas.microsoft.com/office/drawing/2014/main" id="{AC9C7DF3-1055-44DD-9D4E-7987DBC0A1E8}"/>
+                <a16:creationId xmlns:a16="http://schemas.microsoft.com/office/drawing/2014/main" id="{FAC00B3F-19EE-4CCB-943B-874D45B3FF01}"/>
               </a:ext>
             </a:extLst>
           </p:cNvPr>
           <p:cNvCxnSpPr>
             <a:cxnSpLocks/>
-            <a:stCxn id="129" idx="1"/>
-            <a:endCxn id="113" idx="3"/>
-          </p:cNvCxnSpPr>
-          <p:nvPr/>
-        </p:nvCxnSpPr>
-        <p:spPr>
-          <a:xfrm flipH="1" flipV="1">
-            <a:off x="3401746" y="5171937"/>
-            <a:ext cx="274135" cy="2888"/>
-          </a:xfrm>
-          <a:prstGeom prst="straightConnector1">
-            <a:avLst/>
-          </a:prstGeom>
-          <a:ln w="19050" cap="rnd" cmpd="sng">
-            <a:solidFill>
-              <a:schemeClr val="tx1">
-                <a:lumMod val="50000"/>
-                <a:lumOff val="50000"/>
-              </a:schemeClr>
-            </a:solidFill>
-            <a:miter lim="800000"/>
-            <a:headEnd type="none" w="med" len="med"/>
-            <a:tailEnd type="none" w="med" len="med"/>
-          </a:ln>
-        </p:spPr>
-        <p:style>
-          <a:lnRef idx="1">
-            <a:schemeClr val="accent1"/>
-          </a:lnRef>
-          <a:fillRef idx="0">
-            <a:schemeClr val="accent1"/>
-          </a:fillRef>
-          <a:effectRef idx="0">
-            <a:schemeClr val="accent1"/>
-          </a:effectRef>
-          <a:fontRef idx="minor">
-            <a:schemeClr val="tx1"/>
-          </a:fontRef>
-        </p:style>
-      </p:cxnSp>
-      <p:cxnSp>
-        <p:nvCxnSpPr>
-          <p:cNvPr id="117" name="Straight Arrow Connector 116">
-            <a:extLst>
-              <a:ext uri="{FF2B5EF4-FFF2-40B4-BE49-F238E27FC236}">
-                <a16:creationId xmlns:a16="http://schemas.microsoft.com/office/drawing/2014/main" id="{CFBB105E-F852-48D7-80DF-D7DFC3CB74AF}"/>
-              </a:ext>
-            </a:extLst>
-          </p:cNvPr>
-          <p:cNvCxnSpPr>
-            <a:cxnSpLocks/>
-            <a:stCxn id="115" idx="0"/>
-            <a:endCxn id="122" idx="2"/>
-          </p:cNvCxnSpPr>
-          <p:nvPr/>
-        </p:nvCxnSpPr>
-        <p:spPr>
-          <a:xfrm flipV="1">
-            <a:off x="8180244" y="4911849"/>
-            <a:ext cx="0" cy="664633"/>
-          </a:xfrm>
-          <a:prstGeom prst="straightConnector1">
-            <a:avLst/>
-          </a:prstGeom>
-          <a:ln w="19050" cap="rnd" cmpd="sng">
-            <a:solidFill>
-              <a:schemeClr val="tx1">
-                <a:lumMod val="50000"/>
-                <a:lumOff val="50000"/>
-              </a:schemeClr>
-            </a:solidFill>
-            <a:miter lim="800000"/>
-            <a:headEnd type="none" w="med" len="med"/>
-            <a:tailEnd type="none" w="med" len="med"/>
-          </a:ln>
-        </p:spPr>
-        <p:style>
-          <a:lnRef idx="1">
-            <a:schemeClr val="accent1"/>
-          </a:lnRef>
-          <a:fillRef idx="0">
-            <a:schemeClr val="accent1"/>
-          </a:fillRef>
-          <a:effectRef idx="0">
-            <a:schemeClr val="accent1"/>
-          </a:effectRef>
-          <a:fontRef idx="minor">
-            <a:schemeClr val="tx1"/>
-          </a:fontRef>
-        </p:style>
-      </p:cxnSp>
-      <p:sp>
-        <p:nvSpPr>
-          <p:cNvPr id="122" name="Rectangle: Rounded Corners 121">
-            <a:extLst>
-              <a:ext uri="{FF2B5EF4-FFF2-40B4-BE49-F238E27FC236}">
-                <a16:creationId xmlns:a16="http://schemas.microsoft.com/office/drawing/2014/main" id="{B0A82005-8F7B-404F-9CDD-3A84E3367336}"/>
-              </a:ext>
-            </a:extLst>
-          </p:cNvPr>
-          <p:cNvSpPr/>
-          <p:nvPr/>
-        </p:nvSpPr>
-        <p:spPr>
-          <a:xfrm>
-            <a:off x="7692219" y="4549898"/>
-            <a:ext cx="976055" cy="361951"/>
-          </a:xfrm>
-          <a:prstGeom prst="roundRect">
-            <a:avLst/>
-          </a:prstGeom>
-          <a:ln>
-            <a:solidFill>
-              <a:schemeClr val="bg1">
-                <a:lumMod val="50000"/>
-              </a:schemeClr>
-            </a:solidFill>
-          </a:ln>
-        </p:spPr>
-        <p:style>
-          <a:lnRef idx="3">
-            <a:schemeClr val="lt1"/>
-          </a:lnRef>
-          <a:fillRef idx="1">
-            <a:schemeClr val="accent3"/>
-          </a:fillRef>
-          <a:effectRef idx="1">
-            <a:schemeClr val="accent3"/>
-          </a:effectRef>
-          <a:fontRef idx="minor">
-            <a:schemeClr val="lt1"/>
-          </a:fontRef>
-        </p:style>
-        <p:txBody>
-          <a:bodyPr rtlCol="0" anchor="ctr"/>
-          <a:lstStyle/>
-          <a:p>
-            <a:pPr algn="ctr"/>
-            <a:r>
-              <a:rPr lang="de-DE" sz="1400" dirty="0"/>
-              <a:t>GCA173</a:t>
-            </a:r>
-            <a:endParaRPr lang="de-DE" sz="1400" b="1" dirty="0"/>
-          </a:p>
-        </p:txBody>
-      </p:sp>
-      <p:sp>
-        <p:nvSpPr>
-          <p:cNvPr id="123" name="Rectangle: Rounded Corners 122">
-            <a:extLst>
-              <a:ext uri="{FF2B5EF4-FFF2-40B4-BE49-F238E27FC236}">
-                <a16:creationId xmlns:a16="http://schemas.microsoft.com/office/drawing/2014/main" id="{53CABF5B-C744-46E7-9EFB-1B94AA18E8DA}"/>
-              </a:ext>
-            </a:extLst>
-          </p:cNvPr>
-          <p:cNvSpPr/>
-          <p:nvPr/>
-        </p:nvSpPr>
-        <p:spPr>
-          <a:xfrm>
-            <a:off x="5741867" y="4995611"/>
-            <a:ext cx="976055" cy="361951"/>
-          </a:xfrm>
-          <a:prstGeom prst="roundRect">
-            <a:avLst/>
-          </a:prstGeom>
-          <a:ln>
-            <a:solidFill>
-              <a:schemeClr val="bg1">
-                <a:lumMod val="50000"/>
-              </a:schemeClr>
-            </a:solidFill>
-          </a:ln>
-        </p:spPr>
-        <p:style>
-          <a:lnRef idx="3">
-            <a:schemeClr val="lt1"/>
-          </a:lnRef>
-          <a:fillRef idx="1">
-            <a:schemeClr val="accent3"/>
-          </a:fillRef>
-          <a:effectRef idx="1">
-            <a:schemeClr val="accent3"/>
-          </a:effectRef>
-          <a:fontRef idx="minor">
-            <a:schemeClr val="lt1"/>
-          </a:fontRef>
-        </p:style>
-        <p:txBody>
-          <a:bodyPr rtlCol="0" anchor="ctr"/>
-          <a:lstStyle/>
-          <a:p>
-            <a:pPr algn="ctr"/>
-            <a:r>
-              <a:rPr lang="de-DE" sz="1400" dirty="0"/>
-              <a:t>GCA-Pi03</a:t>
-            </a:r>
-            <a:endParaRPr lang="de-DE" sz="1400" b="1" dirty="0"/>
-          </a:p>
-        </p:txBody>
-      </p:sp>
-      <p:sp>
-        <p:nvSpPr>
-          <p:cNvPr id="129" name="Rectangle: Rounded Corners 128">
-            <a:extLst>
-              <a:ext uri="{FF2B5EF4-FFF2-40B4-BE49-F238E27FC236}">
-                <a16:creationId xmlns:a16="http://schemas.microsoft.com/office/drawing/2014/main" id="{B9C7F1DB-B97B-4392-B6B9-1A8D70175BD3}"/>
-              </a:ext>
-            </a:extLst>
-          </p:cNvPr>
-          <p:cNvSpPr/>
-          <p:nvPr/>
-        </p:nvSpPr>
-        <p:spPr>
-          <a:xfrm>
-            <a:off x="3675880" y="4993851"/>
-            <a:ext cx="1132429" cy="361951"/>
-          </a:xfrm>
-          <a:prstGeom prst="roundRect">
-            <a:avLst/>
-          </a:prstGeom>
-          <a:ln>
-            <a:solidFill>
-              <a:schemeClr val="bg1">
-                <a:lumMod val="50000"/>
-              </a:schemeClr>
-            </a:solidFill>
-          </a:ln>
-        </p:spPr>
-        <p:style>
-          <a:lnRef idx="3">
-            <a:schemeClr val="lt1"/>
-          </a:lnRef>
-          <a:fillRef idx="1">
-            <a:schemeClr val="accent3"/>
-          </a:fillRef>
-          <a:effectRef idx="1">
-            <a:schemeClr val="accent3"/>
-          </a:effectRef>
-          <a:fontRef idx="minor">
-            <a:schemeClr val="lt1"/>
-          </a:fontRef>
-        </p:style>
-        <p:txBody>
-          <a:bodyPr rtlCol="0" anchor="ctr"/>
-          <a:lstStyle/>
-          <a:p>
-            <a:pPr algn="ctr"/>
-            <a:r>
-              <a:rPr lang="de-DE" sz="1400" dirty="0"/>
-              <a:t>ES-05 </a:t>
-            </a:r>
-            <a:r>
-              <a:rPr lang="de-DE" sz="1400" dirty="0" err="1"/>
-              <a:t>Servo</a:t>
-            </a:r>
-            <a:endParaRPr lang="de-DE" sz="1400" b="1" dirty="0"/>
-          </a:p>
-        </p:txBody>
-      </p:sp>
-      <p:cxnSp>
-        <p:nvCxnSpPr>
-          <p:cNvPr id="133" name="Straight Arrow Connector 132">
-            <a:extLst>
-              <a:ext uri="{FF2B5EF4-FFF2-40B4-BE49-F238E27FC236}">
-                <a16:creationId xmlns:a16="http://schemas.microsoft.com/office/drawing/2014/main" id="{79675A2B-D0BF-40EE-A381-22409206FF7E}"/>
-              </a:ext>
-            </a:extLst>
-          </p:cNvPr>
-          <p:cNvCxnSpPr>
-            <a:cxnSpLocks/>
-            <a:stCxn id="123" idx="1"/>
-            <a:endCxn id="129" idx="3"/>
-          </p:cNvCxnSpPr>
-          <p:nvPr/>
-        </p:nvCxnSpPr>
-        <p:spPr>
-          <a:xfrm flipH="1" flipV="1">
-            <a:off x="4808310" y="5174827"/>
-            <a:ext cx="933559" cy="1759"/>
-          </a:xfrm>
-          <a:prstGeom prst="straightConnector1">
-            <a:avLst/>
-          </a:prstGeom>
-          <a:ln w="19050" cap="rnd" cmpd="sng">
-            <a:solidFill>
-              <a:schemeClr val="tx1">
-                <a:lumMod val="50000"/>
-                <a:lumOff val="50000"/>
-              </a:schemeClr>
-            </a:solidFill>
-            <a:miter lim="800000"/>
-            <a:headEnd type="none" w="med" len="med"/>
-            <a:tailEnd type="none" w="med" len="med"/>
-          </a:ln>
-        </p:spPr>
-        <p:style>
-          <a:lnRef idx="1">
-            <a:schemeClr val="accent1"/>
-          </a:lnRef>
-          <a:fillRef idx="0">
-            <a:schemeClr val="accent1"/>
-          </a:fillRef>
-          <a:effectRef idx="0">
-            <a:schemeClr val="accent1"/>
-          </a:effectRef>
-          <a:fontRef idx="minor">
-            <a:schemeClr val="tx1"/>
-          </a:fontRef>
-        </p:style>
-      </p:cxnSp>
-      <p:sp>
-        <p:nvSpPr>
-          <p:cNvPr id="147" name="Rectangle: Rounded Corners 146">
-            <a:extLst>
-              <a:ext uri="{FF2B5EF4-FFF2-40B4-BE49-F238E27FC236}">
-                <a16:creationId xmlns:a16="http://schemas.microsoft.com/office/drawing/2014/main" id="{8633036C-360A-49A2-BEA4-6F0DF7C072A3}"/>
-              </a:ext>
-            </a:extLst>
-          </p:cNvPr>
-          <p:cNvSpPr/>
-          <p:nvPr/>
-        </p:nvSpPr>
-        <p:spPr>
-          <a:xfrm>
-            <a:off x="5741867" y="3855878"/>
-            <a:ext cx="976055" cy="361951"/>
-          </a:xfrm>
-          <a:prstGeom prst="roundRect">
-            <a:avLst/>
-          </a:prstGeom>
-          <a:ln>
-            <a:solidFill>
-              <a:schemeClr val="bg1">
-                <a:lumMod val="50000"/>
-              </a:schemeClr>
-            </a:solidFill>
-          </a:ln>
-        </p:spPr>
-        <p:style>
-          <a:lnRef idx="3">
-            <a:schemeClr val="lt1"/>
-          </a:lnRef>
-          <a:fillRef idx="1">
-            <a:schemeClr val="accent3"/>
-          </a:fillRef>
-          <a:effectRef idx="1">
-            <a:schemeClr val="accent3"/>
-          </a:effectRef>
-          <a:fontRef idx="minor">
-            <a:schemeClr val="lt1"/>
-          </a:fontRef>
-        </p:style>
-        <p:txBody>
-          <a:bodyPr rtlCol="0" anchor="ctr"/>
-          <a:lstStyle/>
-          <a:p>
-            <a:pPr algn="ctr"/>
-            <a:r>
-              <a:rPr lang="de-DE" sz="1400" dirty="0"/>
-              <a:t>GCA-Pi06</a:t>
-            </a:r>
-            <a:endParaRPr lang="de-DE" sz="1400" b="1" dirty="0"/>
-          </a:p>
-        </p:txBody>
-      </p:sp>
-      <p:cxnSp>
-        <p:nvCxnSpPr>
-          <p:cNvPr id="7" name="Connector: Elbow 6">
-            <a:extLst>
-              <a:ext uri="{FF2B5EF4-FFF2-40B4-BE49-F238E27FC236}">
-                <a16:creationId xmlns:a16="http://schemas.microsoft.com/office/drawing/2014/main" id="{2F312F9A-1E61-48DE-8FFC-276B374911D9}"/>
-              </a:ext>
-            </a:extLst>
-          </p:cNvPr>
-          <p:cNvCxnSpPr>
-            <a:cxnSpLocks/>
-            <a:stCxn id="60" idx="1"/>
-            <a:endCxn id="147" idx="3"/>
+            <a:stCxn id="130" idx="1"/>
+            <a:endCxn id="104" idx="3"/>
           </p:cNvCxnSpPr>
           <p:nvPr/>
         </p:nvCxnSpPr>
         <p:spPr>
           <a:xfrm rot="10800000">
-            <a:off x="6717921" y="4036854"/>
-            <a:ext cx="983931" cy="2451"/>
+            <a:off x="7051184" y="2304048"/>
+            <a:ext cx="433343" cy="116808"/>
           </a:xfrm>
           <a:prstGeom prst="bentConnector3">
             <a:avLst>
@@ -5240,598 +5564,24 @@
       </p:cxnSp>
       <p:cxnSp>
         <p:nvCxnSpPr>
-          <p:cNvPr id="50" name="Straight Arrow Connector 49">
+          <p:cNvPr id="137" name="Straight Arrow Connector 136">
             <a:extLst>
               <a:ext uri="{FF2B5EF4-FFF2-40B4-BE49-F238E27FC236}">
-                <a16:creationId xmlns:a16="http://schemas.microsoft.com/office/drawing/2014/main" id="{FB38C61A-5046-4993-909A-960B96FE376F}"/>
+                <a16:creationId xmlns:a16="http://schemas.microsoft.com/office/drawing/2014/main" id="{6AB231DD-B8C0-4B58-8C04-DA25BD2AA4D9}"/>
               </a:ext>
             </a:extLst>
           </p:cNvPr>
           <p:cNvCxnSpPr>
             <a:cxnSpLocks/>
-            <a:stCxn id="147" idx="2"/>
-            <a:endCxn id="123" idx="0"/>
-          </p:cNvCxnSpPr>
-          <p:nvPr/>
-        </p:nvCxnSpPr>
-        <p:spPr>
-          <a:xfrm>
-            <a:off x="6229893" y="4217827"/>
-            <a:ext cx="0" cy="777783"/>
-          </a:xfrm>
-          <a:prstGeom prst="straightConnector1">
-            <a:avLst/>
-          </a:prstGeom>
-          <a:ln w="19050" cap="rnd" cmpd="sng">
-            <a:solidFill>
-              <a:schemeClr val="tx1">
-                <a:lumMod val="50000"/>
-                <a:lumOff val="50000"/>
-              </a:schemeClr>
-            </a:solidFill>
-            <a:miter lim="800000"/>
-            <a:headEnd type="none" w="med" len="med"/>
-            <a:tailEnd type="none" w="med" len="med"/>
-          </a:ln>
-        </p:spPr>
-        <p:style>
-          <a:lnRef idx="1">
-            <a:schemeClr val="accent1"/>
-          </a:lnRef>
-          <a:fillRef idx="0">
-            <a:schemeClr val="accent1"/>
-          </a:fillRef>
-          <a:effectRef idx="0">
-            <a:schemeClr val="accent1"/>
-          </a:effectRef>
-          <a:fontRef idx="minor">
-            <a:schemeClr val="tx1"/>
-          </a:fontRef>
-        </p:style>
-      </p:cxnSp>
-      <p:pic>
-        <p:nvPicPr>
-          <p:cNvPr id="54" name="Picture 8" descr="Ãhnliches Foto">
-            <a:extLst>
-              <a:ext uri="{FF2B5EF4-FFF2-40B4-BE49-F238E27FC236}">
-                <a16:creationId xmlns:a16="http://schemas.microsoft.com/office/drawing/2014/main" id="{9A0AD2DB-5656-47B9-B29D-88D79964F50A}"/>
-              </a:ext>
-            </a:extLst>
-          </p:cNvPr>
-          <p:cNvPicPr>
-            <a:picLocks noChangeAspect="1" noChangeArrowheads="1"/>
-          </p:cNvPicPr>
-          <p:nvPr/>
-        </p:nvPicPr>
-        <p:blipFill rotWithShape="1">
-          <a:blip r:embed="rId4">
-            <a:extLst>
-              <a:ext uri="{28A0092B-C50C-407E-A947-70E740481C1C}">
-                <a14:useLocalDpi xmlns:a14="http://schemas.microsoft.com/office/drawing/2010/main" val="0"/>
-              </a:ext>
-            </a:extLst>
-          </a:blip>
-          <a:srcRect t="24430" b="27393"/>
-          <a:stretch/>
-        </p:blipFill>
-        <p:spPr bwMode="auto">
-          <a:xfrm>
-            <a:off x="7447514" y="6040268"/>
-            <a:ext cx="1465463" cy="261259"/>
-          </a:xfrm>
-          <a:prstGeom prst="rect">
-            <a:avLst/>
-          </a:prstGeom>
-          <a:noFill/>
-          <a:extLst>
-            <a:ext uri="{909E8E84-426E-40DD-AFC4-6F175D3DCCD1}">
-              <a14:hiddenFill xmlns:a14="http://schemas.microsoft.com/office/drawing/2010/main">
-                <a:solidFill>
-                  <a:srgbClr val="FFFFFF"/>
-                </a:solidFill>
-              </a14:hiddenFill>
-            </a:ext>
-          </a:extLst>
-        </p:spPr>
-      </p:pic>
-      <p:grpSp>
-        <p:nvGrpSpPr>
-          <p:cNvPr id="64" name="Group 63">
-            <a:extLst>
-              <a:ext uri="{FF2B5EF4-FFF2-40B4-BE49-F238E27FC236}">
-                <a16:creationId xmlns:a16="http://schemas.microsoft.com/office/drawing/2014/main" id="{3B601909-827D-4510-B050-D9DDF734BB6B}"/>
-              </a:ext>
-            </a:extLst>
-          </p:cNvPr>
-          <p:cNvGrpSpPr/>
-          <p:nvPr/>
-        </p:nvGrpSpPr>
-        <p:grpSpPr>
-          <a:xfrm>
-            <a:off x="865572" y="2285654"/>
-            <a:ext cx="736123" cy="698019"/>
-            <a:chOff x="8936383" y="1729011"/>
-            <a:chExt cx="736123" cy="698018"/>
-          </a:xfrm>
-        </p:grpSpPr>
-        <p:sp>
-          <p:nvSpPr>
-            <p:cNvPr id="65" name="Rectangle: Rounded Corners 64">
-              <a:extLst>
-                <a:ext uri="{FF2B5EF4-FFF2-40B4-BE49-F238E27FC236}">
-                  <a16:creationId xmlns:a16="http://schemas.microsoft.com/office/drawing/2014/main" id="{882A7434-69CD-4B0A-8FE0-58C4CC2BA8DA}"/>
-                </a:ext>
-              </a:extLst>
-            </p:cNvPr>
-            <p:cNvSpPr/>
-            <p:nvPr/>
-          </p:nvSpPr>
-          <p:spPr>
-            <a:xfrm>
-              <a:off x="8936383" y="1729011"/>
-              <a:ext cx="736123" cy="698018"/>
-            </a:xfrm>
-            <a:prstGeom prst="roundRect">
-              <a:avLst/>
-            </a:prstGeom>
-            <a:ln>
-              <a:solidFill>
-                <a:schemeClr val="bg1">
-                  <a:lumMod val="50000"/>
-                </a:schemeClr>
-              </a:solidFill>
-            </a:ln>
-          </p:spPr>
-          <p:style>
-            <a:lnRef idx="3">
-              <a:schemeClr val="lt1"/>
-            </a:lnRef>
-            <a:fillRef idx="1">
-              <a:schemeClr val="accent3"/>
-            </a:fillRef>
-            <a:effectRef idx="1">
-              <a:schemeClr val="accent3"/>
-            </a:effectRef>
-            <a:fontRef idx="minor">
-              <a:schemeClr val="lt1"/>
-            </a:fontRef>
-          </p:style>
-          <p:txBody>
-            <a:bodyPr rtlCol="0" anchor="b"/>
-            <a:lstStyle/>
-            <a:p>
-              <a:pPr algn="ctr"/>
-              <a:r>
-                <a:rPr lang="de-DE" sz="1200" dirty="0"/>
-                <a:t>Netzteil</a:t>
-              </a:r>
-              <a:endParaRPr lang="de-DE" sz="1200" b="1" dirty="0"/>
-            </a:p>
-          </p:txBody>
-        </p:sp>
-        <p:pic>
-          <p:nvPicPr>
-            <p:cNvPr id="67" name="Picture 2" descr="Bildergebnis fÃ¼r strom">
-              <a:extLst>
-                <a:ext uri="{FF2B5EF4-FFF2-40B4-BE49-F238E27FC236}">
-                  <a16:creationId xmlns:a16="http://schemas.microsoft.com/office/drawing/2014/main" id="{7F65B7E2-8FFB-4635-83E1-9AF2F671BEB3}"/>
-                </a:ext>
-              </a:extLst>
-            </p:cNvPr>
-            <p:cNvPicPr>
-              <a:picLocks noChangeAspect="1" noChangeArrowheads="1"/>
-            </p:cNvPicPr>
-            <p:nvPr/>
-          </p:nvPicPr>
-          <p:blipFill>
-            <a:blip r:embed="rId9">
-              <a:extLst>
-                <a:ext uri="{28A0092B-C50C-407E-A947-70E740481C1C}">
-                  <a14:useLocalDpi xmlns:a14="http://schemas.microsoft.com/office/drawing/2010/main" val="0"/>
-                </a:ext>
-              </a:extLst>
-            </a:blip>
-            <a:srcRect/>
-            <a:stretch>
-              <a:fillRect/>
-            </a:stretch>
-          </p:blipFill>
-          <p:spPr bwMode="auto">
-            <a:xfrm>
-              <a:off x="9125869" y="1833451"/>
-              <a:ext cx="338627" cy="329832"/>
-            </a:xfrm>
-            <a:prstGeom prst="rect">
-              <a:avLst/>
-            </a:prstGeom>
-            <a:noFill/>
-            <a:extLst>
-              <a:ext uri="{909E8E84-426E-40DD-AFC4-6F175D3DCCD1}">
-                <a14:hiddenFill xmlns:a14="http://schemas.microsoft.com/office/drawing/2010/main">
-                  <a:solidFill>
-                    <a:srgbClr val="FFFFFF"/>
-                  </a:solidFill>
-                </a14:hiddenFill>
-              </a:ext>
-            </a:extLst>
-          </p:spPr>
-        </p:pic>
-      </p:grpSp>
-      <p:grpSp>
-        <p:nvGrpSpPr>
-          <p:cNvPr id="71" name="Group 70">
-            <a:extLst>
-              <a:ext uri="{FF2B5EF4-FFF2-40B4-BE49-F238E27FC236}">
-                <a16:creationId xmlns:a16="http://schemas.microsoft.com/office/drawing/2014/main" id="{CBCE6D92-1FA3-4B25-A378-0EC9F034AFC4}"/>
-              </a:ext>
-            </a:extLst>
-          </p:cNvPr>
-          <p:cNvGrpSpPr/>
-          <p:nvPr/>
-        </p:nvGrpSpPr>
-        <p:grpSpPr>
-          <a:xfrm>
-            <a:off x="3426661" y="398712"/>
-            <a:ext cx="736123" cy="698019"/>
-            <a:chOff x="8936383" y="1729011"/>
-            <a:chExt cx="736123" cy="698018"/>
-          </a:xfrm>
-        </p:grpSpPr>
-        <p:sp>
-          <p:nvSpPr>
-            <p:cNvPr id="73" name="Rectangle: Rounded Corners 72">
-              <a:extLst>
-                <a:ext uri="{FF2B5EF4-FFF2-40B4-BE49-F238E27FC236}">
-                  <a16:creationId xmlns:a16="http://schemas.microsoft.com/office/drawing/2014/main" id="{99DB6192-4170-4C85-8744-9D18EA668665}"/>
-                </a:ext>
-              </a:extLst>
-            </p:cNvPr>
-            <p:cNvSpPr/>
-            <p:nvPr/>
-          </p:nvSpPr>
-          <p:spPr>
-            <a:xfrm>
-              <a:off x="8936383" y="1729011"/>
-              <a:ext cx="736123" cy="698018"/>
-            </a:xfrm>
-            <a:prstGeom prst="roundRect">
-              <a:avLst/>
-            </a:prstGeom>
-            <a:ln>
-              <a:solidFill>
-                <a:schemeClr val="bg1">
-                  <a:lumMod val="50000"/>
-                </a:schemeClr>
-              </a:solidFill>
-            </a:ln>
-          </p:spPr>
-          <p:style>
-            <a:lnRef idx="3">
-              <a:schemeClr val="lt1"/>
-            </a:lnRef>
-            <a:fillRef idx="1">
-              <a:schemeClr val="accent3"/>
-            </a:fillRef>
-            <a:effectRef idx="1">
-              <a:schemeClr val="accent3"/>
-            </a:effectRef>
-            <a:fontRef idx="minor">
-              <a:schemeClr val="lt1"/>
-            </a:fontRef>
-          </p:style>
-          <p:txBody>
-            <a:bodyPr rtlCol="0" anchor="b"/>
-            <a:lstStyle/>
-            <a:p>
-              <a:pPr algn="ctr"/>
-              <a:r>
-                <a:rPr lang="de-DE" sz="1200" dirty="0"/>
-                <a:t>Netzteil</a:t>
-              </a:r>
-              <a:endParaRPr lang="de-DE" sz="1200" b="1" dirty="0"/>
-            </a:p>
-          </p:txBody>
-        </p:sp>
-        <p:pic>
-          <p:nvPicPr>
-            <p:cNvPr id="74" name="Picture 2" descr="Bildergebnis fÃ¼r strom">
-              <a:extLst>
-                <a:ext uri="{FF2B5EF4-FFF2-40B4-BE49-F238E27FC236}">
-                  <a16:creationId xmlns:a16="http://schemas.microsoft.com/office/drawing/2014/main" id="{55829B32-E458-44DA-B9A4-A072D13F760C}"/>
-                </a:ext>
-              </a:extLst>
-            </p:cNvPr>
-            <p:cNvPicPr>
-              <a:picLocks noChangeAspect="1" noChangeArrowheads="1"/>
-            </p:cNvPicPr>
-            <p:nvPr/>
-          </p:nvPicPr>
-          <p:blipFill>
-            <a:blip r:embed="rId9">
-              <a:extLst>
-                <a:ext uri="{28A0092B-C50C-407E-A947-70E740481C1C}">
-                  <a14:useLocalDpi xmlns:a14="http://schemas.microsoft.com/office/drawing/2010/main" val="0"/>
-                </a:ext>
-              </a:extLst>
-            </a:blip>
-            <a:srcRect/>
-            <a:stretch>
-              <a:fillRect/>
-            </a:stretch>
-          </p:blipFill>
-          <p:spPr bwMode="auto">
-            <a:xfrm>
-              <a:off x="9125869" y="1833451"/>
-              <a:ext cx="338627" cy="329832"/>
-            </a:xfrm>
-            <a:prstGeom prst="rect">
-              <a:avLst/>
-            </a:prstGeom>
-            <a:noFill/>
-            <a:extLst>
-              <a:ext uri="{909E8E84-426E-40DD-AFC4-6F175D3DCCD1}">
-                <a14:hiddenFill xmlns:a14="http://schemas.microsoft.com/office/drawing/2010/main">
-                  <a:solidFill>
-                    <a:srgbClr val="FFFFFF"/>
-                  </a:solidFill>
-                </a14:hiddenFill>
-              </a:ext>
-            </a:extLst>
-          </p:spPr>
-        </p:pic>
-      </p:grpSp>
-      <p:grpSp>
-        <p:nvGrpSpPr>
-          <p:cNvPr id="24" name="Group 23">
-            <a:extLst>
-              <a:ext uri="{FF2B5EF4-FFF2-40B4-BE49-F238E27FC236}">
-                <a16:creationId xmlns:a16="http://schemas.microsoft.com/office/drawing/2014/main" id="{F0D2B0D7-09D9-4249-8C51-E1CE4315561C}"/>
-              </a:ext>
-            </a:extLst>
-          </p:cNvPr>
-          <p:cNvGrpSpPr/>
-          <p:nvPr/>
-        </p:nvGrpSpPr>
-        <p:grpSpPr>
-          <a:xfrm>
-            <a:off x="4180535" y="3687842"/>
-            <a:ext cx="1258360" cy="698019"/>
-            <a:chOff x="3489595" y="3906884"/>
-            <a:chExt cx="1258360" cy="698018"/>
-          </a:xfrm>
-        </p:grpSpPr>
-        <p:sp>
-          <p:nvSpPr>
-            <p:cNvPr id="76" name="Rectangle: Rounded Corners 75">
-              <a:extLst>
-                <a:ext uri="{FF2B5EF4-FFF2-40B4-BE49-F238E27FC236}">
-                  <a16:creationId xmlns:a16="http://schemas.microsoft.com/office/drawing/2014/main" id="{F8B1C0C0-B67E-4CFF-8450-AA7931805FDA}"/>
-                </a:ext>
-              </a:extLst>
-            </p:cNvPr>
-            <p:cNvSpPr/>
-            <p:nvPr/>
-          </p:nvSpPr>
-          <p:spPr>
-            <a:xfrm>
-              <a:off x="3489595" y="3906884"/>
-              <a:ext cx="1258360" cy="698018"/>
-            </a:xfrm>
-            <a:prstGeom prst="roundRect">
-              <a:avLst/>
-            </a:prstGeom>
-            <a:ln>
-              <a:solidFill>
-                <a:schemeClr val="bg1">
-                  <a:lumMod val="50000"/>
-                </a:schemeClr>
-              </a:solidFill>
-            </a:ln>
-          </p:spPr>
-          <p:style>
-            <a:lnRef idx="3">
-              <a:schemeClr val="lt1"/>
-            </a:lnRef>
-            <a:fillRef idx="1">
-              <a:schemeClr val="accent3"/>
-            </a:fillRef>
-            <a:effectRef idx="1">
-              <a:schemeClr val="accent3"/>
-            </a:effectRef>
-            <a:fontRef idx="minor">
-              <a:schemeClr val="lt1"/>
-            </a:fontRef>
-          </p:style>
-          <p:txBody>
-            <a:bodyPr rtlCol="0" anchor="b"/>
-            <a:lstStyle/>
-            <a:p>
-              <a:pPr algn="ctr"/>
-              <a:r>
-                <a:rPr lang="de-DE" sz="1200" dirty="0"/>
-                <a:t>Netzteil 12V </a:t>
-              </a:r>
-              <a:r>
-                <a:rPr lang="de-DE" sz="1200" dirty="0" err="1"/>
-                <a:t>ac</a:t>
-              </a:r>
-              <a:r>
-                <a:rPr lang="de-DE" sz="1200" dirty="0"/>
-                <a:t> </a:t>
-              </a:r>
-            </a:p>
-          </p:txBody>
-        </p:sp>
-        <p:pic>
-          <p:nvPicPr>
-            <p:cNvPr id="77" name="Picture 2" descr="Bildergebnis fÃ¼r strom">
-              <a:extLst>
-                <a:ext uri="{FF2B5EF4-FFF2-40B4-BE49-F238E27FC236}">
-                  <a16:creationId xmlns:a16="http://schemas.microsoft.com/office/drawing/2014/main" id="{968C1683-FEA2-42E9-AD14-ACDE04766D89}"/>
-                </a:ext>
-              </a:extLst>
-            </p:cNvPr>
-            <p:cNvPicPr>
-              <a:picLocks noChangeAspect="1" noChangeArrowheads="1"/>
-            </p:cNvPicPr>
-            <p:nvPr/>
-          </p:nvPicPr>
-          <p:blipFill>
-            <a:blip r:embed="rId9">
-              <a:extLst>
-                <a:ext uri="{28A0092B-C50C-407E-A947-70E740481C1C}">
-                  <a14:useLocalDpi xmlns:a14="http://schemas.microsoft.com/office/drawing/2010/main" val="0"/>
-                </a:ext>
-              </a:extLst>
-            </a:blip>
-            <a:srcRect/>
-            <a:stretch>
-              <a:fillRect/>
-            </a:stretch>
-          </p:blipFill>
-          <p:spPr bwMode="auto">
-            <a:xfrm>
-              <a:off x="3905983" y="4019713"/>
-              <a:ext cx="338627" cy="329832"/>
-            </a:xfrm>
-            <a:prstGeom prst="rect">
-              <a:avLst/>
-            </a:prstGeom>
-            <a:noFill/>
-            <a:extLst>
-              <a:ext uri="{909E8E84-426E-40DD-AFC4-6F175D3DCCD1}">
-                <a14:hiddenFill xmlns:a14="http://schemas.microsoft.com/office/drawing/2010/main">
-                  <a:solidFill>
-                    <a:srgbClr val="FFFFFF"/>
-                  </a:solidFill>
-                </a14:hiddenFill>
-              </a:ext>
-            </a:extLst>
-          </p:spPr>
-        </p:pic>
-      </p:grpSp>
-      <p:cxnSp>
-        <p:nvCxnSpPr>
-          <p:cNvPr id="79" name="Straight Arrow Connector 78">
-            <a:extLst>
-              <a:ext uri="{FF2B5EF4-FFF2-40B4-BE49-F238E27FC236}">
-                <a16:creationId xmlns:a16="http://schemas.microsoft.com/office/drawing/2014/main" id="{42E65DC0-28E6-4BD9-980D-C7A2613BF44E}"/>
-              </a:ext>
-            </a:extLst>
-          </p:cNvPr>
-          <p:cNvCxnSpPr>
-            <a:cxnSpLocks/>
-            <a:stCxn id="147" idx="1"/>
-            <a:endCxn id="76" idx="3"/>
+            <a:stCxn id="128" idx="1"/>
+            <a:endCxn id="82" idx="3"/>
           </p:cNvCxnSpPr>
           <p:nvPr/>
         </p:nvCxnSpPr>
         <p:spPr>
           <a:xfrm flipH="1" flipV="1">
-            <a:off x="5438897" y="4036853"/>
-            <a:ext cx="302971" cy="1"/>
-          </a:xfrm>
-          <a:prstGeom prst="straightConnector1">
-            <a:avLst/>
-          </a:prstGeom>
-          <a:ln w="19050" cap="rnd" cmpd="sng">
-            <a:solidFill>
-              <a:schemeClr val="tx1">
-                <a:lumMod val="50000"/>
-                <a:lumOff val="50000"/>
-              </a:schemeClr>
-            </a:solidFill>
-            <a:miter lim="800000"/>
-            <a:headEnd type="none" w="med" len="med"/>
-            <a:tailEnd type="none" w="med" len="med"/>
-          </a:ln>
-        </p:spPr>
-        <p:style>
-          <a:lnRef idx="1">
-            <a:schemeClr val="accent1"/>
-          </a:lnRef>
-          <a:fillRef idx="0">
-            <a:schemeClr val="accent1"/>
-          </a:fillRef>
-          <a:effectRef idx="0">
-            <a:schemeClr val="accent1"/>
-          </a:effectRef>
-          <a:fontRef idx="minor">
-            <a:schemeClr val="tx1"/>
-          </a:fontRef>
-        </p:style>
-      </p:cxnSp>
-      <p:cxnSp>
-        <p:nvCxnSpPr>
-          <p:cNvPr id="81" name="Connector: Elbow 80">
-            <a:extLst>
-              <a:ext uri="{FF2B5EF4-FFF2-40B4-BE49-F238E27FC236}">
-                <a16:creationId xmlns:a16="http://schemas.microsoft.com/office/drawing/2014/main" id="{203F1856-DA26-47D6-BF5A-BFE65A68CE37}"/>
-              </a:ext>
-            </a:extLst>
-          </p:cNvPr>
-          <p:cNvCxnSpPr>
-            <a:cxnSpLocks/>
-            <a:stCxn id="73" idx="1"/>
-            <a:endCxn id="1026" idx="0"/>
-          </p:cNvCxnSpPr>
-          <p:nvPr/>
-        </p:nvCxnSpPr>
-        <p:spPr>
-          <a:xfrm rot="10800000" flipV="1">
-            <a:off x="2574959" y="747722"/>
-            <a:ext cx="851700" cy="557049"/>
-          </a:xfrm>
-          <a:prstGeom prst="bentConnector2">
-            <a:avLst/>
-          </a:prstGeom>
-          <a:ln w="19050" cap="rnd" cmpd="sng">
-            <a:solidFill>
-              <a:schemeClr val="tx1">
-                <a:lumMod val="50000"/>
-                <a:lumOff val="50000"/>
-              </a:schemeClr>
-            </a:solidFill>
-            <a:miter lim="800000"/>
-            <a:headEnd type="none" w="med" len="med"/>
-            <a:tailEnd type="none" w="med" len="med"/>
-          </a:ln>
-        </p:spPr>
-        <p:style>
-          <a:lnRef idx="1">
-            <a:schemeClr val="accent1"/>
-          </a:lnRef>
-          <a:fillRef idx="0">
-            <a:schemeClr val="accent1"/>
-          </a:fillRef>
-          <a:effectRef idx="0">
-            <a:schemeClr val="accent1"/>
-          </a:effectRef>
-          <a:fontRef idx="minor">
-            <a:schemeClr val="tx1"/>
-          </a:fontRef>
-        </p:style>
-      </p:cxnSp>
-      <p:cxnSp>
-        <p:nvCxnSpPr>
-          <p:cNvPr id="84" name="Straight Arrow Connector 83">
-            <a:extLst>
-              <a:ext uri="{FF2B5EF4-FFF2-40B4-BE49-F238E27FC236}">
-                <a16:creationId xmlns:a16="http://schemas.microsoft.com/office/drawing/2014/main" id="{9ABB9810-0FB2-4FC6-88E7-76B1E35F72DB}"/>
-              </a:ext>
-            </a:extLst>
-          </p:cNvPr>
-          <p:cNvCxnSpPr>
-            <a:cxnSpLocks/>
-            <a:stCxn id="65" idx="3"/>
-            <a:endCxn id="62" idx="1"/>
-          </p:cNvCxnSpPr>
-          <p:nvPr/>
-        </p:nvCxnSpPr>
-        <p:spPr>
-          <a:xfrm>
-            <a:off x="1601695" y="2634666"/>
-            <a:ext cx="417664" cy="1"/>
+            <a:off x="7042701" y="1665069"/>
+            <a:ext cx="441825" cy="2472"/>
           </a:xfrm>
           <a:prstGeom prst="straightConnector1">
             <a:avLst/>
@@ -5865,10 +5615,10 @@
       </p:cxnSp>
       <p:grpSp>
         <p:nvGrpSpPr>
-          <p:cNvPr id="53" name="Group 52">
+          <p:cNvPr id="140" name="Group 139">
             <a:extLst>
               <a:ext uri="{FF2B5EF4-FFF2-40B4-BE49-F238E27FC236}">
-                <a16:creationId xmlns:a16="http://schemas.microsoft.com/office/drawing/2014/main" id="{FB3381F3-31F4-41FA-ABC7-799823D700A7}"/>
+                <a16:creationId xmlns:a16="http://schemas.microsoft.com/office/drawing/2014/main" id="{C8DB5B4E-78BA-4818-8F39-890FE80B42C5}"/>
               </a:ext>
             </a:extLst>
           </p:cNvPr>
@@ -5877,18 +5627,18 @@
         </p:nvGrpSpPr>
         <p:grpSpPr>
           <a:xfrm>
-            <a:off x="5861833" y="5555058"/>
-            <a:ext cx="736123" cy="698019"/>
-            <a:chOff x="8936383" y="1729011"/>
-            <a:chExt cx="736123" cy="698018"/>
+            <a:off x="845371" y="2756701"/>
+            <a:ext cx="1102032" cy="469478"/>
+            <a:chOff x="2300791" y="1868092"/>
+            <a:chExt cx="1102032" cy="469478"/>
           </a:xfrm>
         </p:grpSpPr>
         <p:sp>
           <p:nvSpPr>
-            <p:cNvPr id="55" name="Rectangle: Rounded Corners 54">
+            <p:cNvPr id="141" name="Rectangle: Rounded Corners 140">
               <a:extLst>
                 <a:ext uri="{FF2B5EF4-FFF2-40B4-BE49-F238E27FC236}">
-                  <a16:creationId xmlns:a16="http://schemas.microsoft.com/office/drawing/2014/main" id="{E4350A66-84F1-45AD-865D-9CA79778F79A}"/>
+                  <a16:creationId xmlns:a16="http://schemas.microsoft.com/office/drawing/2014/main" id="{CFFCFB73-3AF3-4C1B-A411-828BD21551C5}"/>
                 </a:ext>
               </a:extLst>
             </p:cNvPr>
@@ -5897,8 +5647,8 @@
           </p:nvSpPr>
           <p:spPr>
             <a:xfrm>
-              <a:off x="8936383" y="1729011"/>
-              <a:ext cx="736123" cy="698018"/>
+              <a:off x="2300791" y="2007648"/>
+              <a:ext cx="1102032" cy="329922"/>
             </a:xfrm>
             <a:prstGeom prst="roundRect">
               <a:avLst/>
@@ -5926,89 +5676,565 @@
             </a:fontRef>
           </p:style>
           <p:txBody>
-            <a:bodyPr rtlCol="0" anchor="b"/>
+            <a:bodyPr rtlCol="0" anchor="ctr"/>
             <a:lstStyle/>
             <a:p>
               <a:pPr algn="ctr"/>
               <a:r>
                 <a:rPr lang="de-DE" sz="1200" dirty="0"/>
-                <a:t>Netzteil</a:t>
+                <a:t>Wetterstation</a:t>
               </a:r>
-              <a:endParaRPr lang="de-DE" sz="1200" b="1" dirty="0"/>
             </a:p>
           </p:txBody>
         </p:sp>
-        <p:pic>
-          <p:nvPicPr>
-            <p:cNvPr id="56" name="Picture 2" descr="Bildergebnis fÃ¼r strom">
+        <p:sp>
+          <p:nvSpPr>
+            <p:cNvPr id="142" name="Rectangle: Rounded Corners 141">
               <a:extLst>
                 <a:ext uri="{FF2B5EF4-FFF2-40B4-BE49-F238E27FC236}">
-                  <a16:creationId xmlns:a16="http://schemas.microsoft.com/office/drawing/2014/main" id="{63DF19B5-E917-4FBC-95D1-A5BA5FF2B55B}"/>
+                  <a16:creationId xmlns:a16="http://schemas.microsoft.com/office/drawing/2014/main" id="{9FD7E03E-5CFA-444E-81D3-5FF568EB294D}"/>
                 </a:ext>
               </a:extLst>
             </p:cNvPr>
-            <p:cNvPicPr>
-              <a:picLocks noChangeAspect="1" noChangeArrowheads="1"/>
-            </p:cNvPicPr>
+            <p:cNvSpPr/>
             <p:nvPr/>
-          </p:nvPicPr>
-          <p:blipFill>
-            <a:blip r:embed="rId9">
+          </p:nvSpPr>
+          <p:spPr>
+            <a:xfrm>
+              <a:off x="2416450" y="1868092"/>
+              <a:ext cx="870714" cy="112619"/>
+            </a:xfrm>
+            <a:prstGeom prst="roundRect">
+              <a:avLst/>
+            </a:prstGeom>
+            <a:solidFill>
+              <a:srgbClr val="00B050"/>
+            </a:solidFill>
+            <a:ln>
+              <a:solidFill>
+                <a:schemeClr val="bg1">
+                  <a:lumMod val="50000"/>
+                </a:schemeClr>
+              </a:solidFill>
+            </a:ln>
+          </p:spPr>
+          <p:style>
+            <a:lnRef idx="3">
+              <a:schemeClr val="lt1"/>
+            </a:lnRef>
+            <a:fillRef idx="1">
+              <a:schemeClr val="accent3"/>
+            </a:fillRef>
+            <a:effectRef idx="1">
+              <a:schemeClr val="accent3"/>
+            </a:effectRef>
+            <a:fontRef idx="minor">
+              <a:schemeClr val="lt1"/>
+            </a:fontRef>
+          </p:style>
+          <p:txBody>
+            <a:bodyPr rtlCol="0" anchor="ctr"/>
+            <a:lstStyle/>
+            <a:p>
+              <a:pPr algn="ctr"/>
+              <a:r>
+                <a:rPr lang="de-DE" sz="900" dirty="0">
+                  <a:solidFill>
+                    <a:schemeClr val="tx1">
+                      <a:lumMod val="65000"/>
+                      <a:lumOff val="35000"/>
+                    </a:schemeClr>
+                  </a:solidFill>
+                </a:rPr>
+                <a:t>192.168.1.201</a:t>
+              </a:r>
+              <a:endParaRPr lang="de-DE" sz="900" b="1" dirty="0">
+                <a:solidFill>
+                  <a:schemeClr val="tx1">
+                    <a:lumMod val="65000"/>
+                    <a:lumOff val="35000"/>
+                  </a:schemeClr>
+                </a:solidFill>
+              </a:endParaRPr>
+            </a:p>
+          </p:txBody>
+        </p:sp>
+      </p:grpSp>
+      <p:grpSp>
+        <p:nvGrpSpPr>
+          <p:cNvPr id="143" name="Group 142">
+            <a:extLst>
+              <a:ext uri="{FF2B5EF4-FFF2-40B4-BE49-F238E27FC236}">
+                <a16:creationId xmlns:a16="http://schemas.microsoft.com/office/drawing/2014/main" id="{A62E0CB0-0FFE-42D5-9774-39CEE1A2434A}"/>
+              </a:ext>
+            </a:extLst>
+          </p:cNvPr>
+          <p:cNvGrpSpPr/>
+          <p:nvPr/>
+        </p:nvGrpSpPr>
+        <p:grpSpPr>
+          <a:xfrm>
+            <a:off x="845371" y="3346359"/>
+            <a:ext cx="1102032" cy="469478"/>
+            <a:chOff x="2300791" y="1868092"/>
+            <a:chExt cx="1102032" cy="469478"/>
+          </a:xfrm>
+        </p:grpSpPr>
+        <p:sp>
+          <p:nvSpPr>
+            <p:cNvPr id="144" name="Rectangle: Rounded Corners 143">
               <a:extLst>
-                <a:ext uri="{28A0092B-C50C-407E-A947-70E740481C1C}">
-                  <a14:useLocalDpi xmlns:a14="http://schemas.microsoft.com/office/drawing/2010/main" val="0"/>
+                <a:ext uri="{FF2B5EF4-FFF2-40B4-BE49-F238E27FC236}">
+                  <a16:creationId xmlns:a16="http://schemas.microsoft.com/office/drawing/2014/main" id="{BB671172-C818-4E5B-BA06-6FFF7EE68EDB}"/>
                 </a:ext>
               </a:extLst>
-            </a:blip>
-            <a:srcRect/>
-            <a:stretch>
-              <a:fillRect/>
-            </a:stretch>
-          </p:blipFill>
-          <p:spPr bwMode="auto">
+            </p:cNvPr>
+            <p:cNvSpPr/>
+            <p:nvPr/>
+          </p:nvSpPr>
+          <p:spPr>
             <a:xfrm>
-              <a:off x="9125869" y="1833451"/>
-              <a:ext cx="338627" cy="329832"/>
+              <a:off x="2300791" y="2007648"/>
+              <a:ext cx="1102032" cy="329922"/>
             </a:xfrm>
-            <a:prstGeom prst="rect">
+            <a:prstGeom prst="roundRect">
               <a:avLst/>
             </a:prstGeom>
-            <a:noFill/>
+            <a:ln>
+              <a:solidFill>
+                <a:schemeClr val="bg1">
+                  <a:lumMod val="50000"/>
+                </a:schemeClr>
+              </a:solidFill>
+            </a:ln>
+          </p:spPr>
+          <p:style>
+            <a:lnRef idx="3">
+              <a:schemeClr val="lt1"/>
+            </a:lnRef>
+            <a:fillRef idx="1">
+              <a:schemeClr val="accent3"/>
+            </a:fillRef>
+            <a:effectRef idx="1">
+              <a:schemeClr val="accent3"/>
+            </a:effectRef>
+            <a:fontRef idx="minor">
+              <a:schemeClr val="lt1"/>
+            </a:fontRef>
+          </p:style>
+          <p:txBody>
+            <a:bodyPr rtlCol="0" anchor="ctr"/>
+            <a:lstStyle/>
+            <a:p>
+              <a:pPr algn="ctr"/>
+              <a:r>
+                <a:rPr lang="de-DE" sz="1200" dirty="0" err="1"/>
+                <a:t>Harmony</a:t>
+              </a:r>
+              <a:endParaRPr lang="de-DE" sz="1200" dirty="0"/>
+            </a:p>
+          </p:txBody>
+        </p:sp>
+        <p:sp>
+          <p:nvSpPr>
+            <p:cNvPr id="145" name="Rectangle: Rounded Corners 144">
+              <a:extLst>
+                <a:ext uri="{FF2B5EF4-FFF2-40B4-BE49-F238E27FC236}">
+                  <a16:creationId xmlns:a16="http://schemas.microsoft.com/office/drawing/2014/main" id="{7FCF9EB9-B721-4FB4-9242-7E9F9C7B06D1}"/>
+                </a:ext>
+              </a:extLst>
+            </p:cNvPr>
+            <p:cNvSpPr/>
+            <p:nvPr/>
+          </p:nvSpPr>
+          <p:spPr>
+            <a:xfrm>
+              <a:off x="2416450" y="1868092"/>
+              <a:ext cx="870714" cy="112619"/>
+            </a:xfrm>
+            <a:prstGeom prst="roundRect">
+              <a:avLst/>
+            </a:prstGeom>
+            <a:solidFill>
+              <a:srgbClr val="00B050"/>
+            </a:solidFill>
+            <a:ln>
+              <a:solidFill>
+                <a:schemeClr val="bg1">
+                  <a:lumMod val="50000"/>
+                </a:schemeClr>
+              </a:solidFill>
+            </a:ln>
+          </p:spPr>
+          <p:style>
+            <a:lnRef idx="3">
+              <a:schemeClr val="lt1"/>
+            </a:lnRef>
+            <a:fillRef idx="1">
+              <a:schemeClr val="accent3"/>
+            </a:fillRef>
+            <a:effectRef idx="1">
+              <a:schemeClr val="accent3"/>
+            </a:effectRef>
+            <a:fontRef idx="minor">
+              <a:schemeClr val="lt1"/>
+            </a:fontRef>
+          </p:style>
+          <p:txBody>
+            <a:bodyPr rtlCol="0" anchor="ctr"/>
+            <a:lstStyle/>
+            <a:p>
+              <a:pPr algn="ctr"/>
+              <a:r>
+                <a:rPr lang="de-DE" sz="900" dirty="0">
+                  <a:solidFill>
+                    <a:schemeClr val="tx1">
+                      <a:lumMod val="65000"/>
+                      <a:lumOff val="35000"/>
+                    </a:schemeClr>
+                  </a:solidFill>
+                </a:rPr>
+                <a:t>192.168.1.???</a:t>
+              </a:r>
+              <a:endParaRPr lang="de-DE" sz="900" b="1" dirty="0">
+                <a:solidFill>
+                  <a:schemeClr val="tx1">
+                    <a:lumMod val="65000"/>
+                    <a:lumOff val="35000"/>
+                  </a:schemeClr>
+                </a:solidFill>
+              </a:endParaRPr>
+            </a:p>
+          </p:txBody>
+        </p:sp>
+      </p:grpSp>
+      <p:grpSp>
+        <p:nvGrpSpPr>
+          <p:cNvPr id="51" name="Group 50">
             <a:extLst>
-              <a:ext uri="{909E8E84-426E-40DD-AFC4-6F175D3DCCD1}">
-                <a14:hiddenFill xmlns:a14="http://schemas.microsoft.com/office/drawing/2010/main">
-                  <a:solidFill>
-                    <a:srgbClr val="FFFFFF"/>
-                  </a:solidFill>
-                </a14:hiddenFill>
+              <a:ext uri="{FF2B5EF4-FFF2-40B4-BE49-F238E27FC236}">
+                <a16:creationId xmlns:a16="http://schemas.microsoft.com/office/drawing/2014/main" id="{92D70758-18EB-4028-8011-1AFCCAF1296B}"/>
               </a:ext>
             </a:extLst>
+          </p:cNvPr>
+          <p:cNvGrpSpPr/>
+          <p:nvPr/>
+        </p:nvGrpSpPr>
+        <p:grpSpPr>
+          <a:xfrm>
+            <a:off x="845371" y="3936017"/>
+            <a:ext cx="1102032" cy="558716"/>
+            <a:chOff x="2736148" y="4127583"/>
+            <a:chExt cx="1102032" cy="558716"/>
+          </a:xfrm>
+        </p:grpSpPr>
+        <p:sp>
+          <p:nvSpPr>
+            <p:cNvPr id="148" name="Rectangle: Rounded Corners 147">
+              <a:extLst>
+                <a:ext uri="{FF2B5EF4-FFF2-40B4-BE49-F238E27FC236}">
+                  <a16:creationId xmlns:a16="http://schemas.microsoft.com/office/drawing/2014/main" id="{D3F33BCE-7E91-40FF-B593-82620211A6D5}"/>
+                </a:ext>
+              </a:extLst>
+            </p:cNvPr>
+            <p:cNvSpPr/>
+            <p:nvPr/>
+          </p:nvSpPr>
+          <p:spPr>
+            <a:xfrm>
+              <a:off x="2736148" y="4251960"/>
+              <a:ext cx="1102032" cy="434339"/>
+            </a:xfrm>
+            <a:prstGeom prst="roundRect">
+              <a:avLst/>
+            </a:prstGeom>
+            <a:ln>
+              <a:solidFill>
+                <a:schemeClr val="bg1">
+                  <a:lumMod val="50000"/>
+                </a:schemeClr>
+              </a:solidFill>
+            </a:ln>
           </p:spPr>
-        </p:pic>
+          <p:style>
+            <a:lnRef idx="3">
+              <a:schemeClr val="lt1"/>
+            </a:lnRef>
+            <a:fillRef idx="1">
+              <a:schemeClr val="accent3"/>
+            </a:fillRef>
+            <a:effectRef idx="1">
+              <a:schemeClr val="accent3"/>
+            </a:effectRef>
+            <a:fontRef idx="minor">
+              <a:schemeClr val="lt1"/>
+            </a:fontRef>
+          </p:style>
+          <p:txBody>
+            <a:bodyPr rtlCol="0" anchor="ctr"/>
+            <a:lstStyle/>
+            <a:p>
+              <a:pPr algn="ctr"/>
+              <a:r>
+                <a:rPr lang="de-DE" sz="1200" dirty="0" err="1"/>
+                <a:t>MusicCast</a:t>
+              </a:r>
+              <a:r>
+                <a:rPr lang="de-DE" sz="1200" dirty="0"/>
+                <a:t> Wohnzimmer</a:t>
+              </a:r>
+            </a:p>
+          </p:txBody>
+        </p:sp>
+        <p:sp>
+          <p:nvSpPr>
+            <p:cNvPr id="149" name="Rectangle: Rounded Corners 148">
+              <a:extLst>
+                <a:ext uri="{FF2B5EF4-FFF2-40B4-BE49-F238E27FC236}">
+                  <a16:creationId xmlns:a16="http://schemas.microsoft.com/office/drawing/2014/main" id="{EC953CC9-AF6F-4115-9A91-77246274CCAE}"/>
+                </a:ext>
+              </a:extLst>
+            </p:cNvPr>
+            <p:cNvSpPr/>
+            <p:nvPr/>
+          </p:nvSpPr>
+          <p:spPr>
+            <a:xfrm>
+              <a:off x="2851807" y="4127583"/>
+              <a:ext cx="870714" cy="112619"/>
+            </a:xfrm>
+            <a:prstGeom prst="roundRect">
+              <a:avLst/>
+            </a:prstGeom>
+            <a:solidFill>
+              <a:srgbClr val="00B050"/>
+            </a:solidFill>
+            <a:ln>
+              <a:solidFill>
+                <a:schemeClr val="bg1">
+                  <a:lumMod val="50000"/>
+                </a:schemeClr>
+              </a:solidFill>
+            </a:ln>
+          </p:spPr>
+          <p:style>
+            <a:lnRef idx="3">
+              <a:schemeClr val="lt1"/>
+            </a:lnRef>
+            <a:fillRef idx="1">
+              <a:schemeClr val="accent3"/>
+            </a:fillRef>
+            <a:effectRef idx="1">
+              <a:schemeClr val="accent3"/>
+            </a:effectRef>
+            <a:fontRef idx="minor">
+              <a:schemeClr val="lt1"/>
+            </a:fontRef>
+          </p:style>
+          <p:txBody>
+            <a:bodyPr rtlCol="0" anchor="ctr"/>
+            <a:lstStyle/>
+            <a:p>
+              <a:pPr algn="ctr"/>
+              <a:r>
+                <a:rPr lang="de-DE" sz="900" dirty="0">
+                  <a:solidFill>
+                    <a:schemeClr val="tx1">
+                      <a:lumMod val="65000"/>
+                      <a:lumOff val="35000"/>
+                    </a:schemeClr>
+                  </a:solidFill>
+                </a:rPr>
+                <a:t>192.168.1.120</a:t>
+              </a:r>
+              <a:endParaRPr lang="de-DE" sz="900" b="1" dirty="0">
+                <a:solidFill>
+                  <a:schemeClr val="tx1">
+                    <a:lumMod val="65000"/>
+                    <a:lumOff val="35000"/>
+                  </a:schemeClr>
+                </a:solidFill>
+              </a:endParaRPr>
+            </a:p>
+          </p:txBody>
+        </p:sp>
+      </p:grpSp>
+      <p:grpSp>
+        <p:nvGrpSpPr>
+          <p:cNvPr id="150" name="Group 149">
+            <a:extLst>
+              <a:ext uri="{FF2B5EF4-FFF2-40B4-BE49-F238E27FC236}">
+                <a16:creationId xmlns:a16="http://schemas.microsoft.com/office/drawing/2014/main" id="{6680A583-CEF4-4D77-A0DB-7FC8BA6D368E}"/>
+              </a:ext>
+            </a:extLst>
+          </p:cNvPr>
+          <p:cNvGrpSpPr/>
+          <p:nvPr/>
+        </p:nvGrpSpPr>
+        <p:grpSpPr>
+          <a:xfrm>
+            <a:off x="845371" y="4614912"/>
+            <a:ext cx="1102032" cy="558716"/>
+            <a:chOff x="2736148" y="4127583"/>
+            <a:chExt cx="1102032" cy="558716"/>
+          </a:xfrm>
+        </p:grpSpPr>
+        <p:sp>
+          <p:nvSpPr>
+            <p:cNvPr id="151" name="Rectangle: Rounded Corners 150">
+              <a:extLst>
+                <a:ext uri="{FF2B5EF4-FFF2-40B4-BE49-F238E27FC236}">
+                  <a16:creationId xmlns:a16="http://schemas.microsoft.com/office/drawing/2014/main" id="{E80ED38B-3EC8-4243-B5D6-4CE9225903BA}"/>
+                </a:ext>
+              </a:extLst>
+            </p:cNvPr>
+            <p:cNvSpPr/>
+            <p:nvPr/>
+          </p:nvSpPr>
+          <p:spPr>
+            <a:xfrm>
+              <a:off x="2736148" y="4251960"/>
+              <a:ext cx="1102032" cy="434339"/>
+            </a:xfrm>
+            <a:prstGeom prst="roundRect">
+              <a:avLst/>
+            </a:prstGeom>
+            <a:ln>
+              <a:solidFill>
+                <a:schemeClr val="bg1">
+                  <a:lumMod val="50000"/>
+                </a:schemeClr>
+              </a:solidFill>
+            </a:ln>
+          </p:spPr>
+          <p:style>
+            <a:lnRef idx="3">
+              <a:schemeClr val="lt1"/>
+            </a:lnRef>
+            <a:fillRef idx="1">
+              <a:schemeClr val="accent3"/>
+            </a:fillRef>
+            <a:effectRef idx="1">
+              <a:schemeClr val="accent3"/>
+            </a:effectRef>
+            <a:fontRef idx="minor">
+              <a:schemeClr val="lt1"/>
+            </a:fontRef>
+          </p:style>
+          <p:txBody>
+            <a:bodyPr rtlCol="0" anchor="ctr"/>
+            <a:lstStyle/>
+            <a:p>
+              <a:pPr algn="ctr"/>
+              <a:r>
+                <a:rPr lang="de-DE" sz="1200" dirty="0" err="1"/>
+                <a:t>MusicCast</a:t>
+              </a:r>
+              <a:r>
+                <a:rPr lang="de-DE" sz="1200" dirty="0"/>
+                <a:t> Esszimmer</a:t>
+              </a:r>
+            </a:p>
+          </p:txBody>
+        </p:sp>
+        <p:sp>
+          <p:nvSpPr>
+            <p:cNvPr id="152" name="Rectangle: Rounded Corners 151">
+              <a:extLst>
+                <a:ext uri="{FF2B5EF4-FFF2-40B4-BE49-F238E27FC236}">
+                  <a16:creationId xmlns:a16="http://schemas.microsoft.com/office/drawing/2014/main" id="{028B8549-CD13-4261-A805-893956976182}"/>
+                </a:ext>
+              </a:extLst>
+            </p:cNvPr>
+            <p:cNvSpPr/>
+            <p:nvPr/>
+          </p:nvSpPr>
+          <p:spPr>
+            <a:xfrm>
+              <a:off x="2851807" y="4127583"/>
+              <a:ext cx="870714" cy="112619"/>
+            </a:xfrm>
+            <a:prstGeom prst="roundRect">
+              <a:avLst/>
+            </a:prstGeom>
+            <a:solidFill>
+              <a:srgbClr val="00B050"/>
+            </a:solidFill>
+            <a:ln>
+              <a:solidFill>
+                <a:schemeClr val="bg1">
+                  <a:lumMod val="50000"/>
+                </a:schemeClr>
+              </a:solidFill>
+            </a:ln>
+          </p:spPr>
+          <p:style>
+            <a:lnRef idx="3">
+              <a:schemeClr val="lt1"/>
+            </a:lnRef>
+            <a:fillRef idx="1">
+              <a:schemeClr val="accent3"/>
+            </a:fillRef>
+            <a:effectRef idx="1">
+              <a:schemeClr val="accent3"/>
+            </a:effectRef>
+            <a:fontRef idx="minor">
+              <a:schemeClr val="lt1"/>
+            </a:fontRef>
+          </p:style>
+          <p:txBody>
+            <a:bodyPr rtlCol="0" anchor="ctr"/>
+            <a:lstStyle/>
+            <a:p>
+              <a:pPr algn="ctr"/>
+              <a:r>
+                <a:rPr lang="de-DE" sz="900" dirty="0">
+                  <a:solidFill>
+                    <a:schemeClr val="tx1">
+                      <a:lumMod val="65000"/>
+                      <a:lumOff val="35000"/>
+                    </a:schemeClr>
+                  </a:solidFill>
+                </a:rPr>
+                <a:t>192.168.1.120</a:t>
+              </a:r>
+              <a:endParaRPr lang="de-DE" sz="900" b="1" dirty="0">
+                <a:solidFill>
+                  <a:schemeClr val="tx1">
+                    <a:lumMod val="65000"/>
+                    <a:lumOff val="35000"/>
+                  </a:schemeClr>
+                </a:solidFill>
+              </a:endParaRPr>
+            </a:p>
+          </p:txBody>
+        </p:sp>
       </p:grpSp>
       <p:cxnSp>
         <p:nvCxnSpPr>
-          <p:cNvPr id="57" name="Straight Arrow Connector 56">
+          <p:cNvPr id="153" name="Connector: Elbow 152">
             <a:extLst>
               <a:ext uri="{FF2B5EF4-FFF2-40B4-BE49-F238E27FC236}">
-                <a16:creationId xmlns:a16="http://schemas.microsoft.com/office/drawing/2014/main" id="{40C59BEC-2E86-4E8F-BD9C-7D7AAF802D8C}"/>
+                <a16:creationId xmlns:a16="http://schemas.microsoft.com/office/drawing/2014/main" id="{1494A4CD-3368-479D-870A-FF94870E920C}"/>
               </a:ext>
             </a:extLst>
           </p:cNvPr>
           <p:cNvCxnSpPr>
             <a:cxnSpLocks/>
-            <a:stCxn id="55" idx="0"/>
-            <a:endCxn id="123" idx="2"/>
+            <a:stCxn id="125" idx="1"/>
+            <a:endCxn id="141" idx="3"/>
           </p:cNvCxnSpPr>
           <p:nvPr/>
         </p:nvCxnSpPr>
         <p:spPr>
-          <a:xfrm flipV="1">
-            <a:off x="6229893" y="5357560"/>
-            <a:ext cx="0" cy="197499"/>
+          <a:xfrm rot="10800000" flipV="1">
+            <a:off x="1947404" y="2856812"/>
+            <a:ext cx="2152311" cy="204406"/>
           </a:xfrm>
-          <a:prstGeom prst="straightConnector1">
-            <a:avLst/>
+          <a:prstGeom prst="bentConnector3">
+            <a:avLst>
+              <a:gd name="adj1" fmla="val 50000"/>
+            </a:avLst>
           </a:prstGeom>
           <a:ln w="19050" cap="rnd" cmpd="sng">
             <a:solidFill>
@@ -6037,12 +6263,171 @@
           </a:fontRef>
         </p:style>
       </p:cxnSp>
-      <p:sp>
-        <p:nvSpPr>
-          <p:cNvPr id="60" name="Rectangle: Rounded Corners 59">
+      <p:cxnSp>
+        <p:nvCxnSpPr>
+          <p:cNvPr id="158" name="Connector: Elbow 157">
             <a:extLst>
               <a:ext uri="{FF2B5EF4-FFF2-40B4-BE49-F238E27FC236}">
-                <a16:creationId xmlns:a16="http://schemas.microsoft.com/office/drawing/2014/main" id="{F52E15BA-2B62-4EEF-BB87-A8A763376AE1}"/>
+                <a16:creationId xmlns:a16="http://schemas.microsoft.com/office/drawing/2014/main" id="{5BA4E0D6-F5EA-4709-B490-000743E1DAD3}"/>
+              </a:ext>
+            </a:extLst>
+          </p:cNvPr>
+          <p:cNvCxnSpPr>
+            <a:cxnSpLocks/>
+            <a:stCxn id="125" idx="1"/>
+            <a:endCxn id="144" idx="3"/>
+          </p:cNvCxnSpPr>
+          <p:nvPr/>
+        </p:nvCxnSpPr>
+        <p:spPr>
+          <a:xfrm rot="10800000" flipV="1">
+            <a:off x="1947404" y="2856812"/>
+            <a:ext cx="2152311" cy="794064"/>
+          </a:xfrm>
+          <a:prstGeom prst="bentConnector3">
+            <a:avLst>
+              <a:gd name="adj1" fmla="val 50000"/>
+            </a:avLst>
+          </a:prstGeom>
+          <a:ln w="19050" cap="rnd" cmpd="sng">
+            <a:solidFill>
+              <a:schemeClr val="tx1">
+                <a:lumMod val="50000"/>
+                <a:lumOff val="50000"/>
+              </a:schemeClr>
+            </a:solidFill>
+            <a:miter lim="800000"/>
+            <a:headEnd type="none" w="med" len="med"/>
+            <a:tailEnd type="none" w="med" len="med"/>
+          </a:ln>
+        </p:spPr>
+        <p:style>
+          <a:lnRef idx="1">
+            <a:schemeClr val="accent1"/>
+          </a:lnRef>
+          <a:fillRef idx="0">
+            <a:schemeClr val="accent1"/>
+          </a:fillRef>
+          <a:effectRef idx="0">
+            <a:schemeClr val="accent1"/>
+          </a:effectRef>
+          <a:fontRef idx="minor">
+            <a:schemeClr val="tx1"/>
+          </a:fontRef>
+        </p:style>
+      </p:cxnSp>
+      <p:cxnSp>
+        <p:nvCxnSpPr>
+          <p:cNvPr id="161" name="Connector: Elbow 160">
+            <a:extLst>
+              <a:ext uri="{FF2B5EF4-FFF2-40B4-BE49-F238E27FC236}">
+                <a16:creationId xmlns:a16="http://schemas.microsoft.com/office/drawing/2014/main" id="{1C6CC647-D5FA-4703-B492-3CA34CA7E3C1}"/>
+              </a:ext>
+            </a:extLst>
+          </p:cNvPr>
+          <p:cNvCxnSpPr>
+            <a:cxnSpLocks/>
+            <a:stCxn id="125" idx="1"/>
+            <a:endCxn id="148" idx="3"/>
+          </p:cNvCxnSpPr>
+          <p:nvPr/>
+        </p:nvCxnSpPr>
+        <p:spPr>
+          <a:xfrm rot="10800000" flipV="1">
+            <a:off x="1947404" y="2856812"/>
+            <a:ext cx="2152311" cy="1420752"/>
+          </a:xfrm>
+          <a:prstGeom prst="bentConnector3">
+            <a:avLst>
+              <a:gd name="adj1" fmla="val 50000"/>
+            </a:avLst>
+          </a:prstGeom>
+          <a:ln w="19050" cap="rnd" cmpd="sng">
+            <a:solidFill>
+              <a:schemeClr val="tx1">
+                <a:lumMod val="50000"/>
+                <a:lumOff val="50000"/>
+              </a:schemeClr>
+            </a:solidFill>
+            <a:miter lim="800000"/>
+            <a:headEnd type="none" w="med" len="med"/>
+            <a:tailEnd type="none" w="med" len="med"/>
+          </a:ln>
+        </p:spPr>
+        <p:style>
+          <a:lnRef idx="1">
+            <a:schemeClr val="accent1"/>
+          </a:lnRef>
+          <a:fillRef idx="0">
+            <a:schemeClr val="accent1"/>
+          </a:fillRef>
+          <a:effectRef idx="0">
+            <a:schemeClr val="accent1"/>
+          </a:effectRef>
+          <a:fontRef idx="minor">
+            <a:schemeClr val="tx1"/>
+          </a:fontRef>
+        </p:style>
+      </p:cxnSp>
+      <p:cxnSp>
+        <p:nvCxnSpPr>
+          <p:cNvPr id="164" name="Connector: Elbow 163">
+            <a:extLst>
+              <a:ext uri="{FF2B5EF4-FFF2-40B4-BE49-F238E27FC236}">
+                <a16:creationId xmlns:a16="http://schemas.microsoft.com/office/drawing/2014/main" id="{133DAB4F-ECAD-47F3-BDE3-43C7785A6106}"/>
+              </a:ext>
+            </a:extLst>
+          </p:cNvPr>
+          <p:cNvCxnSpPr>
+            <a:cxnSpLocks/>
+            <a:stCxn id="125" idx="1"/>
+            <a:endCxn id="151" idx="3"/>
+          </p:cNvCxnSpPr>
+          <p:nvPr/>
+        </p:nvCxnSpPr>
+        <p:spPr>
+          <a:xfrm rot="10800000" flipV="1">
+            <a:off x="1947404" y="2856811"/>
+            <a:ext cx="2152311" cy="2099647"/>
+          </a:xfrm>
+          <a:prstGeom prst="bentConnector3">
+            <a:avLst>
+              <a:gd name="adj1" fmla="val 50000"/>
+            </a:avLst>
+          </a:prstGeom>
+          <a:ln w="19050" cap="rnd" cmpd="sng">
+            <a:solidFill>
+              <a:schemeClr val="tx1">
+                <a:lumMod val="50000"/>
+                <a:lumOff val="50000"/>
+              </a:schemeClr>
+            </a:solidFill>
+            <a:miter lim="800000"/>
+            <a:headEnd type="none" w="med" len="med"/>
+            <a:tailEnd type="none" w="med" len="med"/>
+          </a:ln>
+        </p:spPr>
+        <p:style>
+          <a:lnRef idx="1">
+            <a:schemeClr val="accent1"/>
+          </a:lnRef>
+          <a:fillRef idx="0">
+            <a:schemeClr val="accent1"/>
+          </a:fillRef>
+          <a:effectRef idx="0">
+            <a:schemeClr val="accent1"/>
+          </a:effectRef>
+          <a:fontRef idx="minor">
+            <a:schemeClr val="tx1"/>
+          </a:fontRef>
+        </p:style>
+      </p:cxnSp>
+      <p:sp>
+        <p:nvSpPr>
+          <p:cNvPr id="167" name="Rectangle: Rounded Corners 166">
+            <a:extLst>
+              <a:ext uri="{FF2B5EF4-FFF2-40B4-BE49-F238E27FC236}">
+                <a16:creationId xmlns:a16="http://schemas.microsoft.com/office/drawing/2014/main" id="{FC780C90-6B68-41A6-982E-17B8BB7AD1FD}"/>
               </a:ext>
             </a:extLst>
           </p:cNvPr>
@@ -6051,12 +6436,18 @@
         </p:nvSpPr>
         <p:spPr>
           <a:xfrm>
-            <a:off x="7701851" y="3858328"/>
-            <a:ext cx="967496" cy="361951"/>
+            <a:off x="3987065" y="3993213"/>
+            <a:ext cx="1300178" cy="642789"/>
           </a:xfrm>
           <a:prstGeom prst="roundRect">
             <a:avLst/>
           </a:prstGeom>
+          <a:solidFill>
+            <a:schemeClr val="accent4">
+              <a:lumMod val="60000"/>
+              <a:lumOff val="40000"/>
+            </a:schemeClr>
+          </a:solidFill>
           <a:ln>
             <a:solidFill>
               <a:schemeClr val="bg1">
@@ -6083,35 +6474,127 @@
           <a:bodyPr rtlCol="0" anchor="ctr"/>
           <a:lstStyle/>
           <a:p>
-            <a:pPr algn="ctr"/>
-            <a:r>
-              <a:rPr lang="de-DE" sz="1400" dirty="0"/>
-              <a:t>GCA-Pi02</a:t>
-            </a:r>
-            <a:endParaRPr lang="de-DE" sz="1400" b="1" dirty="0"/>
+            <a:r>
+              <a:rPr lang="de-DE" sz="1000" b="1" dirty="0">
+                <a:solidFill>
+                  <a:schemeClr val="tx1">
+                    <a:lumMod val="65000"/>
+                    <a:lumOff val="35000"/>
+                  </a:schemeClr>
+                </a:solidFill>
+              </a:rPr>
+              <a:t>Shelly</a:t>
+            </a:r>
+          </a:p>
+          <a:p>
+            <a:pPr marL="171450" indent="-171450">
+              <a:buFont typeface="Arial" panose="020B0604020202020204" pitchFamily="34" charset="0"/>
+              <a:buChar char="•"/>
+            </a:pPr>
+            <a:r>
+              <a:rPr lang="de-DE" sz="1000" dirty="0">
+                <a:solidFill>
+                  <a:schemeClr val="tx1">
+                    <a:lumMod val="65000"/>
+                    <a:lumOff val="35000"/>
+                  </a:schemeClr>
+                </a:solidFill>
+              </a:rPr>
+              <a:t>Leon RGB</a:t>
+            </a:r>
+          </a:p>
+          <a:p>
+            <a:pPr marL="171450" indent="-171450">
+              <a:buFont typeface="Arial" panose="020B0604020202020204" pitchFamily="34" charset="0"/>
+              <a:buChar char="•"/>
+            </a:pPr>
+            <a:r>
+              <a:rPr lang="de-DE" sz="1000" dirty="0">
+                <a:solidFill>
+                  <a:schemeClr val="tx1">
+                    <a:lumMod val="65000"/>
+                    <a:lumOff val="35000"/>
+                  </a:schemeClr>
+                </a:solidFill>
+              </a:rPr>
+              <a:t>Vincent RGB</a:t>
+            </a:r>
           </a:p>
         </p:txBody>
       </p:sp>
       <p:cxnSp>
         <p:nvCxnSpPr>
-          <p:cNvPr id="61" name="Straight Arrow Connector 60">
+          <p:cNvPr id="173" name="Connector: Elbow 172">
             <a:extLst>
               <a:ext uri="{FF2B5EF4-FFF2-40B4-BE49-F238E27FC236}">
-                <a16:creationId xmlns:a16="http://schemas.microsoft.com/office/drawing/2014/main" id="{E8FECA25-DF99-47A7-8BA0-DC0242C80503}"/>
+                <a16:creationId xmlns:a16="http://schemas.microsoft.com/office/drawing/2014/main" id="{F19E4ADE-0A4E-4905-AC26-3EDD551DCC87}"/>
               </a:ext>
             </a:extLst>
           </p:cNvPr>
           <p:cNvCxnSpPr>
             <a:cxnSpLocks/>
-            <a:stCxn id="60" idx="2"/>
-            <a:endCxn id="122" idx="0"/>
+            <a:stCxn id="125" idx="3"/>
+            <a:endCxn id="114" idx="1"/>
+          </p:cNvCxnSpPr>
+          <p:nvPr/>
+        </p:nvCxnSpPr>
+        <p:spPr>
+          <a:xfrm>
+            <a:off x="5174596" y="2856812"/>
+            <a:ext cx="597817" cy="601791"/>
+          </a:xfrm>
+          <a:prstGeom prst="bentConnector3">
+            <a:avLst>
+              <a:gd name="adj1" fmla="val 50000"/>
+            </a:avLst>
+          </a:prstGeom>
+          <a:ln w="19050" cap="rnd" cmpd="sng">
+            <a:solidFill>
+              <a:schemeClr val="tx1">
+                <a:lumMod val="50000"/>
+                <a:lumOff val="50000"/>
+              </a:schemeClr>
+            </a:solidFill>
+            <a:miter lim="800000"/>
+            <a:headEnd type="none" w="med" len="med"/>
+            <a:tailEnd type="none" w="med" len="med"/>
+          </a:ln>
+        </p:spPr>
+        <p:style>
+          <a:lnRef idx="1">
+            <a:schemeClr val="accent1"/>
+          </a:lnRef>
+          <a:fillRef idx="0">
+            <a:schemeClr val="accent1"/>
+          </a:fillRef>
+          <a:effectRef idx="0">
+            <a:schemeClr val="accent1"/>
+          </a:effectRef>
+          <a:fontRef idx="minor">
+            <a:schemeClr val="tx1"/>
+          </a:fontRef>
+        </p:style>
+      </p:cxnSp>
+      <p:cxnSp>
+        <p:nvCxnSpPr>
+          <p:cNvPr id="176" name="Straight Arrow Connector 175">
+            <a:extLst>
+              <a:ext uri="{FF2B5EF4-FFF2-40B4-BE49-F238E27FC236}">
+                <a16:creationId xmlns:a16="http://schemas.microsoft.com/office/drawing/2014/main" id="{39236925-5EB6-43FC-B188-016EFC4FDFC5}"/>
+              </a:ext>
+            </a:extLst>
+          </p:cNvPr>
+          <p:cNvCxnSpPr>
+            <a:cxnSpLocks/>
+            <a:stCxn id="125" idx="2"/>
+            <a:endCxn id="167" idx="0"/>
           </p:cNvCxnSpPr>
           <p:nvPr/>
         </p:nvCxnSpPr>
         <p:spPr>
           <a:xfrm flipH="1">
-            <a:off x="8180245" y="4220278"/>
-            <a:ext cx="5355" cy="329619"/>
+            <a:off x="4637154" y="3021773"/>
+            <a:ext cx="1" cy="971440"/>
           </a:xfrm>
           <a:prstGeom prst="straightConnector1">
             <a:avLst/>

</xml_diff>